<commit_message>
A few updates to TemplateMethod and CoR presentations
A few updates to TemplateMethod and CoR presentations
</commit_message>
<xml_diff>
--- a/CSharpProgramming/Presentations/OOProgPartIII/TemplateMethod.pptx
+++ b/CSharpProgramming/Presentations/OOProgPartIII/TemplateMethod.pptx
@@ -20,16 +20,19 @@
     <p:sldId id="467" r:id="rId14"/>
     <p:sldId id="460" r:id="rId15"/>
     <p:sldId id="468" r:id="rId16"/>
-    <p:sldId id="462" r:id="rId17"/>
-    <p:sldId id="463" r:id="rId18"/>
-    <p:sldId id="464" r:id="rId19"/>
-    <p:sldId id="469" r:id="rId20"/>
-    <p:sldId id="470" r:id="rId21"/>
-    <p:sldId id="471" r:id="rId22"/>
-    <p:sldId id="472" r:id="rId23"/>
-    <p:sldId id="473" r:id="rId24"/>
-    <p:sldId id="474" r:id="rId25"/>
-    <p:sldId id="475" r:id="rId26"/>
+    <p:sldId id="464" r:id="rId17"/>
+    <p:sldId id="478" r:id="rId18"/>
+    <p:sldId id="477" r:id="rId19"/>
+    <p:sldId id="476" r:id="rId20"/>
+    <p:sldId id="469" r:id="rId21"/>
+    <p:sldId id="470" r:id="rId22"/>
+    <p:sldId id="471" r:id="rId23"/>
+    <p:sldId id="479" r:id="rId24"/>
+    <p:sldId id="472" r:id="rId25"/>
+    <p:sldId id="473" r:id="rId26"/>
+    <p:sldId id="480" r:id="rId27"/>
+    <p:sldId id="474" r:id="rId28"/>
+    <p:sldId id="475" r:id="rId29"/>
   </p:sldIdLst>
   <p:sldSz cx="12192000" cy="6858000"/>
   <p:notesSz cx="6858000" cy="9144000"/>
@@ -267,7 +270,7 @@
           <a:p>
             <a:fld id="{E15B7D8E-2A20-4C0E-991C-872DBB7459A8}" type="datetimeFigureOut">
               <a:rPr lang="da-DK" smtClean="0"/>
-              <a:t>08-04-2018</a:t>
+              <a:t>13-04-2018</a:t>
             </a:fld>
             <a:endParaRPr lang="da-DK"/>
           </a:p>
@@ -437,7 +440,7 @@
           <a:p>
             <a:fld id="{E15B7D8E-2A20-4C0E-991C-872DBB7459A8}" type="datetimeFigureOut">
               <a:rPr lang="da-DK" smtClean="0"/>
-              <a:t>08-04-2018</a:t>
+              <a:t>13-04-2018</a:t>
             </a:fld>
             <a:endParaRPr lang="da-DK"/>
           </a:p>
@@ -617,7 +620,7 @@
           <a:p>
             <a:fld id="{E15B7D8E-2A20-4C0E-991C-872DBB7459A8}" type="datetimeFigureOut">
               <a:rPr lang="da-DK" smtClean="0"/>
-              <a:t>08-04-2018</a:t>
+              <a:t>13-04-2018</a:t>
             </a:fld>
             <a:endParaRPr lang="da-DK"/>
           </a:p>
@@ -787,7 +790,7 @@
           <a:p>
             <a:fld id="{E15B7D8E-2A20-4C0E-991C-872DBB7459A8}" type="datetimeFigureOut">
               <a:rPr lang="da-DK" smtClean="0"/>
-              <a:t>08-04-2018</a:t>
+              <a:t>13-04-2018</a:t>
             </a:fld>
             <a:endParaRPr lang="da-DK"/>
           </a:p>
@@ -1033,7 +1036,7 @@
           <a:p>
             <a:fld id="{E15B7D8E-2A20-4C0E-991C-872DBB7459A8}" type="datetimeFigureOut">
               <a:rPr lang="da-DK" smtClean="0"/>
-              <a:t>08-04-2018</a:t>
+              <a:t>13-04-2018</a:t>
             </a:fld>
             <a:endParaRPr lang="da-DK"/>
           </a:p>
@@ -1265,7 +1268,7 @@
           <a:p>
             <a:fld id="{E15B7D8E-2A20-4C0E-991C-872DBB7459A8}" type="datetimeFigureOut">
               <a:rPr lang="da-DK" smtClean="0"/>
-              <a:t>08-04-2018</a:t>
+              <a:t>13-04-2018</a:t>
             </a:fld>
             <a:endParaRPr lang="da-DK"/>
           </a:p>
@@ -1632,7 +1635,7 @@
           <a:p>
             <a:fld id="{E15B7D8E-2A20-4C0E-991C-872DBB7459A8}" type="datetimeFigureOut">
               <a:rPr lang="da-DK" smtClean="0"/>
-              <a:t>08-04-2018</a:t>
+              <a:t>13-04-2018</a:t>
             </a:fld>
             <a:endParaRPr lang="da-DK"/>
           </a:p>
@@ -1750,7 +1753,7 @@
           <a:p>
             <a:fld id="{E15B7D8E-2A20-4C0E-991C-872DBB7459A8}" type="datetimeFigureOut">
               <a:rPr lang="da-DK" smtClean="0"/>
-              <a:t>08-04-2018</a:t>
+              <a:t>13-04-2018</a:t>
             </a:fld>
             <a:endParaRPr lang="da-DK"/>
           </a:p>
@@ -1845,7 +1848,7 @@
           <a:p>
             <a:fld id="{E15B7D8E-2A20-4C0E-991C-872DBB7459A8}" type="datetimeFigureOut">
               <a:rPr lang="da-DK" smtClean="0"/>
-              <a:t>08-04-2018</a:t>
+              <a:t>13-04-2018</a:t>
             </a:fld>
             <a:endParaRPr lang="da-DK"/>
           </a:p>
@@ -2122,7 +2125,7 @@
           <a:p>
             <a:fld id="{E15B7D8E-2A20-4C0E-991C-872DBB7459A8}" type="datetimeFigureOut">
               <a:rPr lang="da-DK" smtClean="0"/>
-              <a:t>08-04-2018</a:t>
+              <a:t>13-04-2018</a:t>
             </a:fld>
             <a:endParaRPr lang="da-DK"/>
           </a:p>
@@ -2375,7 +2378,7 @@
           <a:p>
             <a:fld id="{E15B7D8E-2A20-4C0E-991C-872DBB7459A8}" type="datetimeFigureOut">
               <a:rPr lang="da-DK" smtClean="0"/>
-              <a:t>08-04-2018</a:t>
+              <a:t>13-04-2018</a:t>
             </a:fld>
             <a:endParaRPr lang="da-DK"/>
           </a:p>
@@ -2588,7 +2591,7 @@
           <a:p>
             <a:fld id="{E15B7D8E-2A20-4C0E-991C-872DBB7459A8}" type="datetimeFigureOut">
               <a:rPr lang="da-DK" smtClean="0"/>
-              <a:t>08-04-2018</a:t>
+              <a:t>13-04-2018</a:t>
             </a:fld>
             <a:endParaRPr lang="da-DK"/>
           </a:p>
@@ -3019,10 +3022,6 @@
               <a:rPr lang="da-DK" sz="9600" smtClean="0"/>
               <a:t>Template Method</a:t>
             </a:r>
-            <a:r>
-              <a:rPr lang="da-DK" sz="9600" smtClean="0"/>
-              <a:t/>
-            </a:r>
             <a:br>
               <a:rPr lang="da-DK" sz="9600" smtClean="0"/>
             </a:br>
@@ -3188,10 +3187,51 @@
                 </a:solidFill>
                 <a:latin typeface="Consolas" panose="020B0609020204030204" pitchFamily="49" charset="0"/>
               </a:rPr>
-              <a:t>// </a:t>
-            </a:r>
-            <a:r>
-              <a:rPr lang="en-US" sz="2000" b="1">
+              <a:t>// Reset both Fighters to original state</a:t>
+            </a:r>
+          </a:p>
+          <a:p>
+            <a:r>
+              <a:rPr lang="da-DK" sz="2000" b="1" smtClean="0">
+                <a:latin typeface="Consolas" panose="020B0609020204030204" pitchFamily="49" charset="0"/>
+              </a:rPr>
+              <a:t>   fighterA.Reset</a:t>
+            </a:r>
+            <a:r>
+              <a:rPr lang="da-DK" sz="2000" b="1">
+                <a:latin typeface="Consolas" panose="020B0609020204030204" pitchFamily="49" charset="0"/>
+              </a:rPr>
+              <a:t>();</a:t>
+            </a:r>
+          </a:p>
+          <a:p>
+            <a:r>
+              <a:rPr lang="da-DK" sz="2000" b="1" smtClean="0">
+                <a:latin typeface="Consolas" panose="020B0609020204030204" pitchFamily="49" charset="0"/>
+              </a:rPr>
+              <a:t>   fighterB.Reset</a:t>
+            </a:r>
+            <a:r>
+              <a:rPr lang="da-DK" sz="2000" b="1">
+                <a:latin typeface="Consolas" panose="020B0609020204030204" pitchFamily="49" charset="0"/>
+              </a:rPr>
+              <a:t>();</a:t>
+            </a:r>
+          </a:p>
+          <a:p>
+            <a:endParaRPr lang="da-DK" sz="2000" b="1">
+              <a:latin typeface="Consolas" panose="020B0609020204030204" pitchFamily="49" charset="0"/>
+            </a:endParaRPr>
+          </a:p>
+          <a:p>
+            <a:r>
+              <a:rPr lang="da-DK" sz="2000" b="1" smtClean="0">
+                <a:latin typeface="Consolas" panose="020B0609020204030204" pitchFamily="49" charset="0"/>
+              </a:rPr>
+              <a:t>   </a:t>
+            </a:r>
+            <a:r>
+              <a:rPr lang="da-DK" sz="2000" b="1">
                 <a:solidFill>
                   <a:schemeClr val="accent6">
                     <a:lumMod val="75000"/>
@@ -3199,81 +3239,7 @@
                 </a:solidFill>
                 <a:latin typeface="Consolas" panose="020B0609020204030204" pitchFamily="49" charset="0"/>
               </a:rPr>
-              <a:t>Reset both Fighters to original state</a:t>
-            </a:r>
-          </a:p>
-          <a:p>
-            <a:r>
-              <a:rPr lang="da-DK" sz="2000" b="1" smtClean="0">
-                <a:latin typeface="Consolas" panose="020B0609020204030204" pitchFamily="49" charset="0"/>
-              </a:rPr>
-              <a:t>   fighterA.Reset</a:t>
-            </a:r>
-            <a:r>
-              <a:rPr lang="da-DK" sz="2000" b="1">
-                <a:latin typeface="Consolas" panose="020B0609020204030204" pitchFamily="49" charset="0"/>
-              </a:rPr>
-              <a:t>();</a:t>
-            </a:r>
-          </a:p>
-          <a:p>
-            <a:r>
-              <a:rPr lang="da-DK" sz="2000" b="1" smtClean="0">
-                <a:latin typeface="Consolas" panose="020B0609020204030204" pitchFamily="49" charset="0"/>
-              </a:rPr>
-              <a:t>   fighterB.Reset</a:t>
-            </a:r>
-            <a:r>
-              <a:rPr lang="da-DK" sz="2000" b="1">
-                <a:latin typeface="Consolas" panose="020B0609020204030204" pitchFamily="49" charset="0"/>
-              </a:rPr>
-              <a:t>();</a:t>
-            </a:r>
-          </a:p>
-          <a:p>
-            <a:endParaRPr lang="da-DK" sz="2000" b="1">
-              <a:latin typeface="Consolas" panose="020B0609020204030204" pitchFamily="49" charset="0"/>
-            </a:endParaRPr>
-          </a:p>
-          <a:p>
-            <a:r>
-              <a:rPr lang="da-DK" sz="2000" b="1" smtClean="0">
-                <a:latin typeface="Consolas" panose="020B0609020204030204" pitchFamily="49" charset="0"/>
-              </a:rPr>
-              <a:t>   </a:t>
-            </a:r>
-            <a:r>
-              <a:rPr lang="da-DK" sz="2000" b="1">
-                <a:solidFill>
-                  <a:schemeClr val="accent6">
-                    <a:lumMod val="75000"/>
-                  </a:schemeClr>
-                </a:solidFill>
-                <a:latin typeface="Consolas" panose="020B0609020204030204" pitchFamily="49" charset="0"/>
-              </a:rPr>
-              <a:t>// </a:t>
-            </a:r>
-            <a:r>
-              <a:rPr lang="da-DK" sz="2000" b="1">
-                <a:solidFill>
-                  <a:schemeClr val="accent6">
-                    <a:lumMod val="75000"/>
-                  </a:schemeClr>
-                </a:solidFill>
-                <a:latin typeface="Consolas" panose="020B0609020204030204" pitchFamily="49" charset="0"/>
-              </a:rPr>
-              <a:t>Fight </a:t>
-            </a:r>
-            <a:r>
-              <a:rPr lang="da-DK" sz="2000" b="1">
-                <a:solidFill>
-                  <a:schemeClr val="accent6">
-                    <a:lumMod val="75000"/>
-                  </a:schemeClr>
-                </a:solidFill>
-                <a:latin typeface="Consolas" panose="020B0609020204030204" pitchFamily="49" charset="0"/>
-              </a:rPr>
-              <a:t>until </a:t>
+              <a:t>// Fight until </a:t>
             </a:r>
             <a:r>
               <a:rPr lang="da-DK" sz="2000" b="1" smtClean="0">
@@ -3321,21 +3287,31 @@
               <a:rPr lang="da-DK" sz="2000" b="1">
                 <a:latin typeface="Consolas" panose="020B0609020204030204" pitchFamily="49" charset="0"/>
               </a:rPr>
-              <a:t>(!fighterA.Dead &amp;&amp; !fighterB.Dead)</a:t>
-            </a:r>
-          </a:p>
-          <a:p>
+              <a:t>(!</a:t>
+            </a:r>
+            <a:r>
+              <a:rPr lang="da-DK" sz="2000" b="1" smtClean="0">
+                <a:latin typeface="Consolas" panose="020B0609020204030204" pitchFamily="49" charset="0"/>
+              </a:rPr>
+              <a:t>fighterA.Stop </a:t>
+            </a:r>
             <a:r>
               <a:rPr lang="da-DK" sz="2000" b="1">
                 <a:latin typeface="Consolas" panose="020B0609020204030204" pitchFamily="49" charset="0"/>
               </a:rPr>
-              <a:t>   </a:t>
+              <a:t>&amp;&amp; !</a:t>
             </a:r>
             <a:r>
               <a:rPr lang="da-DK" sz="2000" b="1" smtClean="0">
                 <a:latin typeface="Consolas" panose="020B0609020204030204" pitchFamily="49" charset="0"/>
               </a:rPr>
-              <a:t>{</a:t>
+              <a:t>fighterB.Stop</a:t>
+            </a:r>
+            <a:r>
+              <a:rPr lang="da-DK" sz="2000" b="1">
+                <a:latin typeface="Consolas" panose="020B0609020204030204" pitchFamily="49" charset="0"/>
+              </a:rPr>
+              <a:t>)</a:t>
             </a:r>
             <a:endParaRPr lang="da-DK" sz="2000" b="1">
               <a:latin typeface="Consolas" panose="020B0609020204030204" pitchFamily="49" charset="0"/>
@@ -3343,24 +3319,16 @@
           </a:p>
           <a:p>
             <a:r>
+              <a:rPr lang="da-DK" sz="2000" b="1">
+                <a:latin typeface="Consolas" panose="020B0609020204030204" pitchFamily="49" charset="0"/>
+              </a:rPr>
+              <a:t>   </a:t>
+            </a:r>
+            <a:r>
               <a:rPr lang="da-DK" sz="2000" b="1" smtClean="0">
                 <a:latin typeface="Consolas" panose="020B0609020204030204" pitchFamily="49" charset="0"/>
               </a:rPr>
-              <a:t>      ExchangeBlows(fighterA</a:t>
-            </a:r>
-            <a:r>
-              <a:rPr lang="da-DK" sz="2000" b="1">
-                <a:latin typeface="Consolas" panose="020B0609020204030204" pitchFamily="49" charset="0"/>
-              </a:rPr>
-              <a:t>, fighterB);</a:t>
-            </a:r>
-          </a:p>
-          <a:p>
-            <a:r>
-              <a:rPr lang="da-DK" sz="2000" b="1" smtClean="0">
-                <a:latin typeface="Consolas" panose="020B0609020204030204" pitchFamily="49" charset="0"/>
-              </a:rPr>
-              <a:t>   }</a:t>
+              <a:t>{</a:t>
             </a:r>
             <a:endParaRPr lang="da-DK" sz="2000" b="1">
               <a:latin typeface="Consolas" panose="020B0609020204030204" pitchFamily="49" charset="0"/>
@@ -3368,14 +3336,36 @@
           </a:p>
           <a:p>
             <a:r>
+              <a:rPr lang="da-DK" sz="2000" b="1" smtClean="0">
+                <a:latin typeface="Consolas" panose="020B0609020204030204" pitchFamily="49" charset="0"/>
+              </a:rPr>
+              <a:t>      ExchangeBlows(fighterA</a:t>
+            </a:r>
+            <a:r>
               <a:rPr lang="da-DK" sz="2000" b="1">
                 <a:latin typeface="Consolas" panose="020B0609020204030204" pitchFamily="49" charset="0"/>
               </a:rPr>
-              <a:t>}</a:t>
+              <a:t>, fighterB);</a:t>
+            </a:r>
+          </a:p>
+          <a:p>
+            <a:r>
+              <a:rPr lang="da-DK" sz="2000" b="1" smtClean="0">
+                <a:latin typeface="Consolas" panose="020B0609020204030204" pitchFamily="49" charset="0"/>
+              </a:rPr>
+              <a:t>   }</a:t>
             </a:r>
             <a:endParaRPr lang="da-DK" sz="2000" b="1">
               <a:latin typeface="Consolas" panose="020B0609020204030204" pitchFamily="49" charset="0"/>
             </a:endParaRPr>
+          </a:p>
+          <a:p>
+            <a:r>
+              <a:rPr lang="da-DK" sz="2000" b="1">
+                <a:latin typeface="Consolas" panose="020B0609020204030204" pitchFamily="49" charset="0"/>
+              </a:rPr>
+              <a:t>}</a:t>
+            </a:r>
           </a:p>
         </p:txBody>
       </p:sp>
@@ -3541,10 +3531,51 @@
                 </a:solidFill>
                 <a:latin typeface="Consolas" panose="020B0609020204030204" pitchFamily="49" charset="0"/>
               </a:rPr>
-              <a:t>// </a:t>
-            </a:r>
-            <a:r>
-              <a:rPr lang="en-US" sz="1200" b="1">
+              <a:t>// Reset both Fighters to original state</a:t>
+            </a:r>
+          </a:p>
+          <a:p>
+            <a:r>
+              <a:rPr lang="da-DK" sz="1200" b="1" smtClean="0">
+                <a:latin typeface="Consolas" panose="020B0609020204030204" pitchFamily="49" charset="0"/>
+              </a:rPr>
+              <a:t>   fighterA.Reset</a:t>
+            </a:r>
+            <a:r>
+              <a:rPr lang="da-DK" sz="1200" b="1">
+                <a:latin typeface="Consolas" panose="020B0609020204030204" pitchFamily="49" charset="0"/>
+              </a:rPr>
+              <a:t>();</a:t>
+            </a:r>
+          </a:p>
+          <a:p>
+            <a:r>
+              <a:rPr lang="da-DK" sz="1200" b="1" smtClean="0">
+                <a:latin typeface="Consolas" panose="020B0609020204030204" pitchFamily="49" charset="0"/>
+              </a:rPr>
+              <a:t>   fighterB.Reset</a:t>
+            </a:r>
+            <a:r>
+              <a:rPr lang="da-DK" sz="1200" b="1">
+                <a:latin typeface="Consolas" panose="020B0609020204030204" pitchFamily="49" charset="0"/>
+              </a:rPr>
+              <a:t>();</a:t>
+            </a:r>
+          </a:p>
+          <a:p>
+            <a:endParaRPr lang="da-DK" sz="1200" b="1">
+              <a:latin typeface="Consolas" panose="020B0609020204030204" pitchFamily="49" charset="0"/>
+            </a:endParaRPr>
+          </a:p>
+          <a:p>
+            <a:r>
+              <a:rPr lang="da-DK" sz="1200" b="1" smtClean="0">
+                <a:latin typeface="Consolas" panose="020B0609020204030204" pitchFamily="49" charset="0"/>
+              </a:rPr>
+              <a:t>   </a:t>
+            </a:r>
+            <a:r>
+              <a:rPr lang="da-DK" sz="1200" b="1">
                 <a:solidFill>
                   <a:schemeClr val="accent6">
                     <a:lumMod val="75000"/>
@@ -3552,81 +3583,7 @@
                 </a:solidFill>
                 <a:latin typeface="Consolas" panose="020B0609020204030204" pitchFamily="49" charset="0"/>
               </a:rPr>
-              <a:t>Reset both Fighters to original state</a:t>
-            </a:r>
-          </a:p>
-          <a:p>
-            <a:r>
-              <a:rPr lang="da-DK" sz="1200" b="1" smtClean="0">
-                <a:latin typeface="Consolas" panose="020B0609020204030204" pitchFamily="49" charset="0"/>
-              </a:rPr>
-              <a:t>   fighterA.Reset</a:t>
-            </a:r>
-            <a:r>
-              <a:rPr lang="da-DK" sz="1200" b="1">
-                <a:latin typeface="Consolas" panose="020B0609020204030204" pitchFamily="49" charset="0"/>
-              </a:rPr>
-              <a:t>();</a:t>
-            </a:r>
-          </a:p>
-          <a:p>
-            <a:r>
-              <a:rPr lang="da-DK" sz="1200" b="1" smtClean="0">
-                <a:latin typeface="Consolas" panose="020B0609020204030204" pitchFamily="49" charset="0"/>
-              </a:rPr>
-              <a:t>   fighterB.Reset</a:t>
-            </a:r>
-            <a:r>
-              <a:rPr lang="da-DK" sz="1200" b="1">
-                <a:latin typeface="Consolas" panose="020B0609020204030204" pitchFamily="49" charset="0"/>
-              </a:rPr>
-              <a:t>();</a:t>
-            </a:r>
-          </a:p>
-          <a:p>
-            <a:endParaRPr lang="da-DK" sz="1200" b="1">
-              <a:latin typeface="Consolas" panose="020B0609020204030204" pitchFamily="49" charset="0"/>
-            </a:endParaRPr>
-          </a:p>
-          <a:p>
-            <a:r>
-              <a:rPr lang="da-DK" sz="1200" b="1" smtClean="0">
-                <a:latin typeface="Consolas" panose="020B0609020204030204" pitchFamily="49" charset="0"/>
-              </a:rPr>
-              <a:t>   </a:t>
-            </a:r>
-            <a:r>
-              <a:rPr lang="da-DK" sz="1200" b="1">
-                <a:solidFill>
-                  <a:schemeClr val="accent6">
-                    <a:lumMod val="75000"/>
-                  </a:schemeClr>
-                </a:solidFill>
-                <a:latin typeface="Consolas" panose="020B0609020204030204" pitchFamily="49" charset="0"/>
-              </a:rPr>
-              <a:t>// </a:t>
-            </a:r>
-            <a:r>
-              <a:rPr lang="da-DK" sz="1200" b="1">
-                <a:solidFill>
-                  <a:schemeClr val="accent6">
-                    <a:lumMod val="75000"/>
-                  </a:schemeClr>
-                </a:solidFill>
-                <a:latin typeface="Consolas" panose="020B0609020204030204" pitchFamily="49" charset="0"/>
-              </a:rPr>
-              <a:t>Fight </a:t>
-            </a:r>
-            <a:r>
-              <a:rPr lang="da-DK" sz="1200" b="1">
-                <a:solidFill>
-                  <a:schemeClr val="accent6">
-                    <a:lumMod val="75000"/>
-                  </a:schemeClr>
-                </a:solidFill>
-                <a:latin typeface="Consolas" panose="020B0609020204030204" pitchFamily="49" charset="0"/>
-              </a:rPr>
-              <a:t>until </a:t>
+              <a:t>// Fight until </a:t>
             </a:r>
             <a:r>
               <a:rPr lang="da-DK" sz="1200" b="1" smtClean="0">
@@ -3674,21 +3631,31 @@
               <a:rPr lang="da-DK" sz="1200" b="1">
                 <a:latin typeface="Consolas" panose="020B0609020204030204" pitchFamily="49" charset="0"/>
               </a:rPr>
-              <a:t>(!fighterA.Dead &amp;&amp; !fighterB.Dead)</a:t>
-            </a:r>
-          </a:p>
-          <a:p>
+              <a:t>(!</a:t>
+            </a:r>
+            <a:r>
+              <a:rPr lang="da-DK" sz="1200" b="1" smtClean="0">
+                <a:latin typeface="Consolas" panose="020B0609020204030204" pitchFamily="49" charset="0"/>
+              </a:rPr>
+              <a:t>fighterA.Stop </a:t>
+            </a:r>
             <a:r>
               <a:rPr lang="da-DK" sz="1200" b="1">
                 <a:latin typeface="Consolas" panose="020B0609020204030204" pitchFamily="49" charset="0"/>
               </a:rPr>
-              <a:t>   </a:t>
+              <a:t>&amp;&amp; !</a:t>
             </a:r>
             <a:r>
               <a:rPr lang="da-DK" sz="1200" b="1" smtClean="0">
                 <a:latin typeface="Consolas" panose="020B0609020204030204" pitchFamily="49" charset="0"/>
               </a:rPr>
-              <a:t>{</a:t>
+              <a:t>fighterB.Stop</a:t>
+            </a:r>
+            <a:r>
+              <a:rPr lang="da-DK" sz="1200" b="1">
+                <a:latin typeface="Consolas" panose="020B0609020204030204" pitchFamily="49" charset="0"/>
+              </a:rPr>
+              <a:t>)</a:t>
             </a:r>
             <a:endParaRPr lang="da-DK" sz="1200" b="1">
               <a:latin typeface="Consolas" panose="020B0609020204030204" pitchFamily="49" charset="0"/>
@@ -3696,24 +3663,16 @@
           </a:p>
           <a:p>
             <a:r>
+              <a:rPr lang="da-DK" sz="1200" b="1">
+                <a:latin typeface="Consolas" panose="020B0609020204030204" pitchFamily="49" charset="0"/>
+              </a:rPr>
+              <a:t>   </a:t>
+            </a:r>
+            <a:r>
               <a:rPr lang="da-DK" sz="1200" b="1" smtClean="0">
                 <a:latin typeface="Consolas" panose="020B0609020204030204" pitchFamily="49" charset="0"/>
               </a:rPr>
-              <a:t>      ExchangeBlows(fighterA</a:t>
-            </a:r>
-            <a:r>
-              <a:rPr lang="da-DK" sz="1200" b="1">
-                <a:latin typeface="Consolas" panose="020B0609020204030204" pitchFamily="49" charset="0"/>
-              </a:rPr>
-              <a:t>, fighterB);</a:t>
-            </a:r>
-          </a:p>
-          <a:p>
-            <a:r>
-              <a:rPr lang="da-DK" sz="1200" b="1" smtClean="0">
-                <a:latin typeface="Consolas" panose="020B0609020204030204" pitchFamily="49" charset="0"/>
-              </a:rPr>
-              <a:t>   }</a:t>
+              <a:t>{</a:t>
             </a:r>
             <a:endParaRPr lang="da-DK" sz="1200" b="1">
               <a:latin typeface="Consolas" panose="020B0609020204030204" pitchFamily="49" charset="0"/>
@@ -3721,14 +3680,36 @@
           </a:p>
           <a:p>
             <a:r>
+              <a:rPr lang="da-DK" sz="1200" b="1" smtClean="0">
+                <a:latin typeface="Consolas" panose="020B0609020204030204" pitchFamily="49" charset="0"/>
+              </a:rPr>
+              <a:t>      ExchangeBlows(fighterA</a:t>
+            </a:r>
+            <a:r>
               <a:rPr lang="da-DK" sz="1200" b="1">
                 <a:latin typeface="Consolas" panose="020B0609020204030204" pitchFamily="49" charset="0"/>
               </a:rPr>
-              <a:t>}</a:t>
+              <a:t>, fighterB);</a:t>
+            </a:r>
+          </a:p>
+          <a:p>
+            <a:r>
+              <a:rPr lang="da-DK" sz="1200" b="1" smtClean="0">
+                <a:latin typeface="Consolas" panose="020B0609020204030204" pitchFamily="49" charset="0"/>
+              </a:rPr>
+              <a:t>   }</a:t>
             </a:r>
             <a:endParaRPr lang="da-DK" sz="1200" b="1">
               <a:latin typeface="Consolas" panose="020B0609020204030204" pitchFamily="49" charset="0"/>
             </a:endParaRPr>
+          </a:p>
+          <a:p>
+            <a:r>
+              <a:rPr lang="da-DK" sz="1200" b="1">
+                <a:latin typeface="Consolas" panose="020B0609020204030204" pitchFamily="49" charset="0"/>
+              </a:rPr>
+              <a:t>}</a:t>
+            </a:r>
           </a:p>
         </p:txBody>
       </p:sp>
@@ -3822,12 +3803,16 @@
   <p:clrMapOvr>
     <a:masterClrMapping/>
   </p:clrMapOvr>
-  <mc:AlternateContent xmlns:mc="http://schemas.openxmlformats.org/markup-compatibility/2006" xmlns:p14="http://schemas.microsoft.com/office/powerpoint/2010/main">
-    <mc:Choice Requires="p14">
-      <p:transition p14:dur="0"/>
+  <mc:AlternateContent xmlns:mc="http://schemas.openxmlformats.org/markup-compatibility/2006">
+    <mc:Choice xmlns:p14="http://schemas.microsoft.com/office/powerpoint/2010/main" Requires="p14">
+      <p:transition spd="med" p14:dur="700">
+        <p:fade/>
+      </p:transition>
     </mc:Choice>
-    <mc:Fallback xmlns="">
-      <p:transition/>
+    <mc:Fallback>
+      <p:transition spd="med">
+        <p:fade/>
+      </p:transition>
     </mc:Fallback>
   </mc:AlternateContent>
   <p:timing>
@@ -3974,16 +3959,7 @@
                 </a:solidFill>
                 <a:latin typeface="Consolas" panose="020B0609020204030204" pitchFamily="49" charset="0"/>
               </a:rPr>
-              <a:t>$"Result </a:t>
-            </a:r>
-            <a:r>
-              <a:rPr lang="da-DK" sz="2000" b="1">
-                <a:solidFill>
-                  <a:srgbClr val="C00000"/>
-                </a:solidFill>
-                <a:latin typeface="Consolas" panose="020B0609020204030204" pitchFamily="49" charset="0"/>
-              </a:rPr>
-              <a:t>of </a:t>
+              <a:t>$"Result of </a:t>
             </a:r>
             <a:r>
               <a:rPr lang="da-DK" sz="2000" b="1" smtClean="0">
@@ -4115,9 +4091,6 @@
               </a:rPr>
               <a:t>();</a:t>
             </a:r>
-            <a:endParaRPr lang="da-DK" sz="2000" b="1">
-              <a:latin typeface="Consolas" panose="020B0609020204030204" pitchFamily="49" charset="0"/>
-            </a:endParaRPr>
           </a:p>
           <a:p>
             <a:r>
@@ -4294,16 +4267,7 @@
                 </a:solidFill>
                 <a:latin typeface="Consolas" panose="020B0609020204030204" pitchFamily="49" charset="0"/>
               </a:rPr>
-              <a:t>$"Result </a:t>
-            </a:r>
-            <a:r>
-              <a:rPr lang="da-DK" sz="1200" b="1">
-                <a:solidFill>
-                  <a:srgbClr val="C00000"/>
-                </a:solidFill>
-                <a:latin typeface="Consolas" panose="020B0609020204030204" pitchFamily="49" charset="0"/>
-              </a:rPr>
-              <a:t>of </a:t>
+              <a:t>$"Result of </a:t>
             </a:r>
             <a:r>
               <a:rPr lang="da-DK" sz="1200" b="1" smtClean="0">
@@ -4435,9 +4399,6 @@
               </a:rPr>
               <a:t>();</a:t>
             </a:r>
-            <a:endParaRPr lang="da-DK" sz="1200" b="1">
-              <a:latin typeface="Consolas" panose="020B0609020204030204" pitchFamily="49" charset="0"/>
-            </a:endParaRPr>
           </a:p>
           <a:p>
             <a:r>
@@ -4556,12 +4517,16 @@
   <p:clrMapOvr>
     <a:masterClrMapping/>
   </p:clrMapOvr>
-  <mc:AlternateContent xmlns:mc="http://schemas.openxmlformats.org/markup-compatibility/2006" xmlns:p14="http://schemas.microsoft.com/office/powerpoint/2010/main">
-    <mc:Choice Requires="p14">
-      <p:transition p14:dur="0"/>
+  <mc:AlternateContent xmlns:mc="http://schemas.openxmlformats.org/markup-compatibility/2006">
+    <mc:Choice xmlns:p14="http://schemas.microsoft.com/office/powerpoint/2010/main" Requires="p14">
+      <p:transition spd="med" p14:dur="700">
+        <p:fade/>
+      </p:transition>
     </mc:Choice>
-    <mc:Fallback xmlns="">
-      <p:transition/>
+    <mc:Fallback>
+      <p:transition spd="med">
+        <p:fade/>
+      </p:transition>
     </mc:Fallback>
   </mc:AlternateContent>
   <p:timing>
@@ -4666,13 +4631,7 @@
               <a:rPr lang="da-DK" sz="2000" b="1">
                 <a:latin typeface="Consolas" panose="020B0609020204030204" pitchFamily="49" charset="0"/>
               </a:rPr>
-              <a:t> </a:t>
-            </a:r>
-            <a:r>
-              <a:rPr lang="da-DK" sz="2000" b="1">
-                <a:latin typeface="Consolas" panose="020B0609020204030204" pitchFamily="49" charset="0"/>
-              </a:rPr>
-              <a:t>fb</a:t>
+              <a:t> fb</a:t>
             </a:r>
             <a:r>
               <a:rPr lang="da-DK" sz="2000" b="1" smtClean="0">
@@ -4803,13 +4762,7 @@
               <a:rPr lang="da-DK" sz="1200" b="1">
                 <a:latin typeface="Consolas" panose="020B0609020204030204" pitchFamily="49" charset="0"/>
               </a:rPr>
-              <a:t> </a:t>
-            </a:r>
-            <a:r>
-              <a:rPr lang="da-DK" sz="1200" b="1">
-                <a:latin typeface="Consolas" panose="020B0609020204030204" pitchFamily="49" charset="0"/>
-              </a:rPr>
-              <a:t>fb</a:t>
+              <a:t> fb</a:t>
             </a:r>
             <a:r>
               <a:rPr lang="da-DK" sz="1200" b="1" smtClean="0">
@@ -4924,12 +4877,16 @@
   <p:clrMapOvr>
     <a:masterClrMapping/>
   </p:clrMapOvr>
-  <mc:AlternateContent xmlns:mc="http://schemas.openxmlformats.org/markup-compatibility/2006" xmlns:p14="http://schemas.microsoft.com/office/powerpoint/2010/main">
-    <mc:Choice Requires="p14">
-      <p:transition p14:dur="0"/>
+  <mc:AlternateContent xmlns:mc="http://schemas.openxmlformats.org/markup-compatibility/2006">
+    <mc:Choice xmlns:p14="http://schemas.microsoft.com/office/powerpoint/2010/main" Requires="p14">
+      <p:transition spd="med" p14:dur="700">
+        <p:fade/>
+      </p:transition>
     </mc:Choice>
-    <mc:Fallback xmlns="">
-      <p:transition/>
+    <mc:Fallback>
+      <p:transition spd="med">
+        <p:fade/>
+      </p:transition>
     </mc:Fallback>
   </mc:AlternateContent>
   <p:timing>
@@ -4963,15 +4920,15 @@
         <p:nvCxnSpPr>
           <p:cNvPr id="16" name="Vinklet forbindelse 2"/>
           <p:cNvCxnSpPr>
-            <a:stCxn id="6" idx="3"/>
-            <a:endCxn id="11" idx="1"/>
+            <a:stCxn id="6" idx="1"/>
+            <a:endCxn id="11" idx="3"/>
           </p:cNvCxnSpPr>
           <p:nvPr/>
         </p:nvCxnSpPr>
         <p:spPr>
-          <a:xfrm flipV="1">
-            <a:off x="6117515" y="4305006"/>
-            <a:ext cx="1361839" cy="1"/>
+          <a:xfrm flipH="1" flipV="1">
+            <a:off x="2635028" y="4305006"/>
+            <a:ext cx="1682027" cy="1"/>
           </a:xfrm>
           <a:prstGeom prst="straightConnector1">
             <a:avLst/>
@@ -5007,7 +4964,7 @@
         </p:nvSpPr>
         <p:spPr>
           <a:xfrm>
-            <a:off x="7479354" y="3845957"/>
+            <a:off x="834568" y="3845957"/>
             <a:ext cx="1800460" cy="918098"/>
           </a:xfrm>
           <a:prstGeom prst="roundRect">
@@ -5042,7 +4999,6 @@
               <a:rPr lang="da-DK" sz="3600" smtClean="0"/>
               <a:t>Fighter</a:t>
             </a:r>
-            <a:endParaRPr lang="da-DK" sz="3600" smtClean="0"/>
           </a:p>
         </p:txBody>
       </p:sp>
@@ -5096,14 +5052,13 @@
               <a:rPr lang="da-DK" sz="3600" smtClean="0"/>
               <a:t>Club</a:t>
             </a:r>
-            <a:endParaRPr lang="da-DK" sz="3600" smtClean="0"/>
           </a:p>
         </p:txBody>
       </p:sp>
     </p:spTree>
     <p:extLst>
       <p:ext uri="{BB962C8B-B14F-4D97-AF65-F5344CB8AC3E}">
-        <p14:creationId xmlns:p14="http://schemas.microsoft.com/office/powerpoint/2010/main" val="174664041"/>
+        <p14:creationId xmlns:p14="http://schemas.microsoft.com/office/powerpoint/2010/main" val="1311385306"/>
       </p:ext>
     </p:extLst>
   </p:cSld>
@@ -5149,15 +5104,15 @@
         <p:nvCxnSpPr>
           <p:cNvPr id="16" name="Vinklet forbindelse 2"/>
           <p:cNvCxnSpPr>
-            <a:stCxn id="6" idx="3"/>
-            <a:endCxn id="11" idx="1"/>
+            <a:stCxn id="6" idx="1"/>
+            <a:endCxn id="11" idx="3"/>
           </p:cNvCxnSpPr>
           <p:nvPr/>
         </p:nvCxnSpPr>
         <p:spPr>
-          <a:xfrm flipV="1">
-            <a:off x="6117515" y="4305006"/>
-            <a:ext cx="1361839" cy="1"/>
+          <a:xfrm flipH="1" flipV="1">
+            <a:off x="2635028" y="4305006"/>
+            <a:ext cx="1682027" cy="1"/>
           </a:xfrm>
           <a:prstGeom prst="straightConnector1">
             <a:avLst/>
@@ -5193,7 +5148,7 @@
         </p:nvSpPr>
         <p:spPr>
           <a:xfrm>
-            <a:off x="7479354" y="3845957"/>
+            <a:off x="834568" y="3845957"/>
             <a:ext cx="1800460" cy="918098"/>
           </a:xfrm>
           <a:prstGeom prst="roundRect">
@@ -5228,7 +5183,6 @@
               <a:rPr lang="da-DK" sz="3600" smtClean="0"/>
               <a:t>Fighter</a:t>
             </a:r>
-            <a:endParaRPr lang="da-DK" sz="3600" smtClean="0"/>
           </a:p>
         </p:txBody>
       </p:sp>
@@ -5282,7 +5236,6 @@
               <a:rPr lang="da-DK" sz="3600" smtClean="0"/>
               <a:t>Club</a:t>
             </a:r>
-            <a:endParaRPr lang="da-DK" sz="3600" smtClean="0"/>
           </a:p>
         </p:txBody>
       </p:sp>
@@ -5346,11 +5299,6 @@
               </a:rPr>
               <a:t>Club</a:t>
             </a:r>
-            <a:endParaRPr lang="da-DK" sz="3600" smtClean="0">
-              <a:solidFill>
-                <a:srgbClr val="FFFF00"/>
-              </a:solidFill>
-            </a:endParaRPr>
           </a:p>
         </p:txBody>
       </p:sp>
@@ -5397,19 +5345,23 @@
     </p:spTree>
     <p:extLst>
       <p:ext uri="{BB962C8B-B14F-4D97-AF65-F5344CB8AC3E}">
-        <p14:creationId xmlns:p14="http://schemas.microsoft.com/office/powerpoint/2010/main" val="4208301587"/>
+        <p14:creationId xmlns:p14="http://schemas.microsoft.com/office/powerpoint/2010/main" val="1911007553"/>
       </p:ext>
     </p:extLst>
   </p:cSld>
   <p:clrMapOvr>
     <a:masterClrMapping/>
   </p:clrMapOvr>
-  <mc:AlternateContent xmlns:mc="http://schemas.openxmlformats.org/markup-compatibility/2006" xmlns:p14="http://schemas.microsoft.com/office/powerpoint/2010/main">
-    <mc:Choice Requires="p14">
-      <p:transition p14:dur="0"/>
+  <mc:AlternateContent xmlns:mc="http://schemas.openxmlformats.org/markup-compatibility/2006">
+    <mc:Choice xmlns:p14="http://schemas.microsoft.com/office/powerpoint/2010/main" Requires="p14">
+      <p:transition spd="med" p14:dur="700">
+        <p:fade/>
+      </p:transition>
     </mc:Choice>
-    <mc:Fallback xmlns="">
-      <p:transition/>
+    <mc:Fallback>
+      <p:transition spd="med">
+        <p:fade/>
+      </p:transition>
     </mc:Fallback>
   </mc:AlternateContent>
   <p:timing>
@@ -5522,7 +5474,6 @@
               <a:rPr lang="da-DK" sz="3600" smtClean="0"/>
               <a:t>Fighter</a:t>
             </a:r>
-            <a:endParaRPr lang="da-DK" sz="3600" smtClean="0"/>
           </a:p>
         </p:txBody>
       </p:sp>
@@ -5576,7 +5527,6 @@
               <a:rPr lang="da-DK" sz="3600" smtClean="0"/>
               <a:t>Club</a:t>
             </a:r>
-            <a:endParaRPr lang="da-DK" sz="3600" smtClean="0"/>
           </a:p>
         </p:txBody>
       </p:sp>
@@ -5640,11 +5590,6 @@
               </a:rPr>
               <a:t>Club</a:t>
             </a:r>
-            <a:endParaRPr lang="da-DK" sz="3600" smtClean="0">
-              <a:solidFill>
-                <a:srgbClr val="FFFF00"/>
-              </a:solidFill>
-            </a:endParaRPr>
           </a:p>
         </p:txBody>
       </p:sp>
@@ -5688,150 +5633,26 @@
           </a:fontRef>
         </p:style>
       </p:cxnSp>
-      <p:sp>
-        <p:nvSpPr>
-          <p:cNvPr id="8" name="Afrundet rektangel 7"/>
-          <p:cNvSpPr/>
-          <p:nvPr/>
-        </p:nvSpPr>
-        <p:spPr>
-          <a:xfrm>
-            <a:off x="534491" y="1397081"/>
-            <a:ext cx="2400614" cy="1424323"/>
-          </a:xfrm>
-          <a:prstGeom prst="roundRect">
-            <a:avLst/>
-          </a:prstGeom>
-          <a:solidFill>
-            <a:schemeClr val="accent6">
-              <a:lumMod val="75000"/>
-            </a:schemeClr>
-          </a:solidFill>
-        </p:spPr>
-        <p:style>
-          <a:lnRef idx="2">
-            <a:schemeClr val="accent1">
-              <a:shade val="50000"/>
-            </a:schemeClr>
-          </a:lnRef>
-          <a:fillRef idx="1">
-            <a:schemeClr val="accent1"/>
-          </a:fillRef>
-          <a:effectRef idx="0">
-            <a:schemeClr val="accent1"/>
-          </a:effectRef>
-          <a:fontRef idx="minor">
-            <a:schemeClr val="lt1"/>
-          </a:fontRef>
-        </p:style>
-        <p:txBody>
-          <a:bodyPr rtlCol="0" anchor="t"/>
-          <a:lstStyle/>
-          <a:p>
-            <a:pPr algn="ctr"/>
-            <a:r>
-              <a:rPr lang="da-DK" sz="3600" smtClean="0"/>
-              <a:t>Client</a:t>
-            </a:r>
-          </a:p>
-        </p:txBody>
-      </p:sp>
-      <p:cxnSp>
-        <p:nvCxnSpPr>
-          <p:cNvPr id="9" name="Vinklet forbindelse 2"/>
-          <p:cNvCxnSpPr>
-            <a:stCxn id="8" idx="3"/>
-            <a:endCxn id="5" idx="1"/>
-          </p:cNvCxnSpPr>
-          <p:nvPr/>
-        </p:nvCxnSpPr>
-        <p:spPr>
-          <a:xfrm>
-            <a:off x="2935105" y="2109243"/>
-            <a:ext cx="1381950" cy="0"/>
-          </a:xfrm>
-          <a:prstGeom prst="straightConnector1">
-            <a:avLst/>
-          </a:prstGeom>
-          <a:ln w="76200">
-            <a:solidFill>
-              <a:schemeClr val="tx1"/>
-            </a:solidFill>
-            <a:headEnd w="lg" len="lg"/>
-            <a:tailEnd type="arrow" w="lg" len="lg"/>
-          </a:ln>
-        </p:spPr>
-        <p:style>
-          <a:lnRef idx="1">
-            <a:schemeClr val="accent1"/>
-          </a:lnRef>
-          <a:fillRef idx="0">
-            <a:schemeClr val="accent1"/>
-          </a:fillRef>
-          <a:effectRef idx="0">
-            <a:schemeClr val="accent1"/>
-          </a:effectRef>
-          <a:fontRef idx="minor">
-            <a:schemeClr val="tx1"/>
-          </a:fontRef>
-        </p:style>
-      </p:cxnSp>
-      <p:cxnSp>
-        <p:nvCxnSpPr>
-          <p:cNvPr id="17" name="Vinklet forbindelse 2"/>
-          <p:cNvCxnSpPr>
-            <a:stCxn id="8" idx="2"/>
-            <a:endCxn id="11" idx="0"/>
-          </p:cNvCxnSpPr>
-          <p:nvPr/>
-        </p:nvCxnSpPr>
-        <p:spPr>
-          <a:xfrm>
-            <a:off x="1734798" y="2821404"/>
-            <a:ext cx="0" cy="1024553"/>
-          </a:xfrm>
-          <a:prstGeom prst="straightConnector1">
-            <a:avLst/>
-          </a:prstGeom>
-          <a:ln w="76200">
-            <a:solidFill>
-              <a:schemeClr val="tx1"/>
-            </a:solidFill>
-            <a:headEnd w="lg" len="lg"/>
-            <a:tailEnd type="arrow" w="lg" len="lg"/>
-          </a:ln>
-        </p:spPr>
-        <p:style>
-          <a:lnRef idx="1">
-            <a:schemeClr val="accent1"/>
-          </a:lnRef>
-          <a:fillRef idx="0">
-            <a:schemeClr val="accent1"/>
-          </a:fillRef>
-          <a:effectRef idx="0">
-            <a:schemeClr val="accent1"/>
-          </a:effectRef>
-          <a:fontRef idx="minor">
-            <a:schemeClr val="tx1"/>
-          </a:fontRef>
-        </p:style>
-      </p:cxnSp>
     </p:spTree>
     <p:extLst>
       <p:ext uri="{BB962C8B-B14F-4D97-AF65-F5344CB8AC3E}">
-        <p14:creationId xmlns:p14="http://schemas.microsoft.com/office/powerpoint/2010/main" val="1311385306"/>
+        <p14:creationId xmlns:p14="http://schemas.microsoft.com/office/powerpoint/2010/main" val="3087393370"/>
       </p:ext>
     </p:extLst>
   </p:cSld>
   <p:clrMapOvr>
     <a:masterClrMapping/>
   </p:clrMapOvr>
-  <mc:AlternateContent xmlns:mc="http://schemas.openxmlformats.org/markup-compatibility/2006" xmlns:p14="http://schemas.microsoft.com/office/powerpoint/2010/main">
-    <mc:Choice Requires="p14">
-      <p:transition p14:dur="0"/>
+  <mc:AlternateContent xmlns:mc="http://schemas.openxmlformats.org/markup-compatibility/2006">
+    <mc:Choice xmlns:p14="http://schemas.microsoft.com/office/powerpoint/2010/main" Requires="p14">
+      <p:transition spd="med" p14:dur="700">
+        <p:fade/>
+      </p:transition>
     </mc:Choice>
-    <mc:Fallback xmlns="">
-      <p:transition/>
+    <mc:Fallback>
+      <p:transition spd="med">
+        <p:fade/>
+      </p:transition>
     </mc:Fallback>
   </mc:AlternateContent>
   <p:timing>
@@ -5944,7 +5765,6 @@
               <a:rPr lang="da-DK" sz="3600" smtClean="0"/>
               <a:t>Fighter</a:t>
             </a:r>
-            <a:endParaRPr lang="da-DK" sz="3600" smtClean="0"/>
           </a:p>
         </p:txBody>
       </p:sp>
@@ -5998,7 +5818,6 @@
               <a:rPr lang="da-DK" sz="3600" smtClean="0"/>
               <a:t>Club</a:t>
             </a:r>
-            <a:endParaRPr lang="da-DK" sz="3600" smtClean="0"/>
           </a:p>
         </p:txBody>
       </p:sp>
@@ -6062,11 +5881,6 @@
               </a:rPr>
               <a:t>Club</a:t>
             </a:r>
-            <a:endParaRPr lang="da-DK" sz="3600" smtClean="0">
-              <a:solidFill>
-                <a:srgbClr val="FFFF00"/>
-              </a:solidFill>
-            </a:endParaRPr>
           </a:p>
         </p:txBody>
       </p:sp>
@@ -6238,123 +6052,26 @@
           </a:fontRef>
         </p:style>
       </p:cxnSp>
-      <p:sp>
-        <p:nvSpPr>
-          <p:cNvPr id="10" name="Afrundet rektangel 9"/>
-          <p:cNvSpPr/>
-          <p:nvPr/>
-        </p:nvSpPr>
-        <p:spPr>
-          <a:xfrm>
-            <a:off x="7363050" y="3592844"/>
-            <a:ext cx="1800460" cy="1424323"/>
-          </a:xfrm>
-          <a:prstGeom prst="roundRect">
-            <a:avLst/>
-          </a:prstGeom>
-          <a:solidFill>
-            <a:srgbClr val="C00000"/>
-          </a:solidFill>
-        </p:spPr>
-        <p:style>
-          <a:lnRef idx="2">
-            <a:schemeClr val="accent1">
-              <a:shade val="50000"/>
-            </a:schemeClr>
-          </a:lnRef>
-          <a:fillRef idx="1">
-            <a:schemeClr val="accent1"/>
-          </a:fillRef>
-          <a:effectRef idx="0">
-            <a:schemeClr val="accent1"/>
-          </a:effectRef>
-          <a:fontRef idx="minor">
-            <a:schemeClr val="lt1"/>
-          </a:fontRef>
-        </p:style>
-        <p:txBody>
-          <a:bodyPr rtlCol="0" anchor="t"/>
-          <a:lstStyle/>
-          <a:p>
-            <a:pPr algn="ctr"/>
-            <a:r>
-              <a:rPr lang="da-DK" sz="2800" smtClean="0"/>
-              <a:t>Fight</a:t>
-            </a:r>
-          </a:p>
-          <a:p>
-            <a:pPr algn="ctr"/>
-            <a:r>
-              <a:rPr lang="da-DK" sz="2800" smtClean="0"/>
-              <a:t>Club</a:t>
-            </a:r>
-          </a:p>
-          <a:p>
-            <a:pPr algn="ctr"/>
-            <a:r>
-              <a:rPr lang="da-DK" sz="2800" smtClean="0"/>
-              <a:t>Fair</a:t>
-            </a:r>
-            <a:endParaRPr lang="da-DK" sz="2800" smtClean="0"/>
-          </a:p>
-        </p:txBody>
-      </p:sp>
-      <p:cxnSp>
-        <p:nvCxnSpPr>
-          <p:cNvPr id="12" name="Vinklet forbindelse 2"/>
-          <p:cNvCxnSpPr>
-            <a:stCxn id="10" idx="1"/>
-            <a:endCxn id="6" idx="3"/>
-          </p:cNvCxnSpPr>
-          <p:nvPr/>
-        </p:nvCxnSpPr>
-        <p:spPr>
-          <a:xfrm flipH="1">
-            <a:off x="6117515" y="4305006"/>
-            <a:ext cx="1245535" cy="1"/>
-          </a:xfrm>
-          <a:prstGeom prst="straightConnector1">
-            <a:avLst/>
-          </a:prstGeom>
-          <a:ln w="76200">
-            <a:solidFill>
-              <a:schemeClr val="tx1"/>
-            </a:solidFill>
-            <a:headEnd w="lg" len="lg"/>
-            <a:tailEnd type="triangle" w="lg" len="lg"/>
-          </a:ln>
-        </p:spPr>
-        <p:style>
-          <a:lnRef idx="1">
-            <a:schemeClr val="accent1"/>
-          </a:lnRef>
-          <a:fillRef idx="0">
-            <a:schemeClr val="accent1"/>
-          </a:fillRef>
-          <a:effectRef idx="0">
-            <a:schemeClr val="accent1"/>
-          </a:effectRef>
-          <a:fontRef idx="minor">
-            <a:schemeClr val="tx1"/>
-          </a:fontRef>
-        </p:style>
-      </p:cxnSp>
     </p:spTree>
     <p:extLst>
       <p:ext uri="{BB962C8B-B14F-4D97-AF65-F5344CB8AC3E}">
-        <p14:creationId xmlns:p14="http://schemas.microsoft.com/office/powerpoint/2010/main" val="1127353810"/>
+        <p14:creationId xmlns:p14="http://schemas.microsoft.com/office/powerpoint/2010/main" val="3432788103"/>
       </p:ext>
     </p:extLst>
   </p:cSld>
   <p:clrMapOvr>
     <a:masterClrMapping/>
   </p:clrMapOvr>
-  <mc:AlternateContent xmlns:mc="http://schemas.openxmlformats.org/markup-compatibility/2006" xmlns:p14="http://schemas.microsoft.com/office/powerpoint/2010/main">
-    <mc:Choice Requires="p14">
-      <p:transition p14:dur="0"/>
+  <mc:AlternateContent xmlns:mc="http://schemas.openxmlformats.org/markup-compatibility/2006">
+    <mc:Choice xmlns:p14="http://schemas.microsoft.com/office/powerpoint/2010/main" Requires="p14">
+      <p:transition spd="med" p14:dur="700">
+        <p:fade/>
+      </p:transition>
     </mc:Choice>
-    <mc:Fallback xmlns="">
-      <p:transition/>
+    <mc:Fallback>
+      <p:transition spd="med">
+        <p:fade/>
+      </p:transition>
     </mc:Fallback>
   </mc:AlternateContent>
   <p:timing>
@@ -6433,7 +6150,6 @@
               <a:rPr lang="da-DK" sz="3200" smtClean="0"/>
               <a:t>We have defined a general algorithm</a:t>
             </a:r>
-            <a:endParaRPr lang="da-DK" sz="3200" smtClean="0"/>
           </a:p>
           <a:p>
             <a:pPr lvl="1"/>
@@ -6515,547 +6231,6 @@
 </file>
 
 <file path=ppt/slides/slide20.xml><?xml version="1.0" encoding="utf-8"?>
-<p:sld xmlns:a="http://schemas.openxmlformats.org/drawingml/2006/main" xmlns:r="http://schemas.openxmlformats.org/officeDocument/2006/relationships" xmlns:p="http://schemas.openxmlformats.org/presentationml/2006/main">
-  <p:cSld>
-    <p:spTree>
-      <p:nvGrpSpPr>
-        <p:cNvPr id="1" name=""/>
-        <p:cNvGrpSpPr/>
-        <p:nvPr/>
-      </p:nvGrpSpPr>
-      <p:grpSpPr>
-        <a:xfrm>
-          <a:off x="0" y="0"/>
-          <a:ext cx="0" cy="0"/>
-          <a:chOff x="0" y="0"/>
-          <a:chExt cx="0" cy="0"/>
-        </a:xfrm>
-      </p:grpSpPr>
-      <p:sp>
-        <p:nvSpPr>
-          <p:cNvPr id="3" name="Tekstfelt 2"/>
-          <p:cNvSpPr txBox="1"/>
-          <p:nvPr/>
-        </p:nvSpPr>
-        <p:spPr>
-          <a:xfrm>
-            <a:off x="962526" y="1012925"/>
-            <a:ext cx="10160669" cy="3785652"/>
-          </a:xfrm>
-          <a:prstGeom prst="rect">
-            <a:avLst/>
-          </a:prstGeom>
-          <a:noFill/>
-        </p:spPr>
-        <p:txBody>
-          <a:bodyPr wrap="square" rtlCol="0">
-            <a:spAutoFit/>
-          </a:bodyPr>
-          <a:lstStyle/>
-          <a:p>
-            <a:r>
-              <a:rPr lang="da-DK" sz="2000" b="1" smtClean="0">
-                <a:solidFill>
-                  <a:srgbClr val="0070C0"/>
-                </a:solidFill>
-                <a:latin typeface="Consolas" panose="020B0609020204030204" pitchFamily="49" charset="0"/>
-              </a:rPr>
-              <a:t>protected override void </a:t>
-            </a:r>
-            <a:r>
-              <a:rPr lang="da-DK" sz="2000" b="1" smtClean="0">
-                <a:latin typeface="Consolas" panose="020B0609020204030204" pitchFamily="49" charset="0"/>
-              </a:rPr>
-              <a:t>ExchangeBlows(</a:t>
-            </a:r>
-            <a:r>
-              <a:rPr lang="da-DK" sz="2000" b="1" smtClean="0">
-                <a:solidFill>
-                  <a:schemeClr val="accent6">
-                    <a:lumMod val="75000"/>
-                  </a:schemeClr>
-                </a:solidFill>
-                <a:latin typeface="Consolas" panose="020B0609020204030204" pitchFamily="49" charset="0"/>
-              </a:rPr>
-              <a:t>Fighter</a:t>
-            </a:r>
-            <a:r>
-              <a:rPr lang="da-DK" sz="2000" b="1" smtClean="0">
-                <a:latin typeface="Consolas" panose="020B0609020204030204" pitchFamily="49" charset="0"/>
-              </a:rPr>
-              <a:t> </a:t>
-            </a:r>
-            <a:r>
-              <a:rPr lang="da-DK" sz="2000" b="1">
-                <a:latin typeface="Consolas" panose="020B0609020204030204" pitchFamily="49" charset="0"/>
-              </a:rPr>
-              <a:t>fa,</a:t>
-            </a:r>
-            <a:r>
-              <a:rPr lang="da-DK" sz="2000" b="1">
-                <a:solidFill>
-                  <a:schemeClr val="accent6">
-                    <a:lumMod val="75000"/>
-                  </a:schemeClr>
-                </a:solidFill>
-                <a:latin typeface="Consolas" panose="020B0609020204030204" pitchFamily="49" charset="0"/>
-              </a:rPr>
-              <a:t> Fighter</a:t>
-            </a:r>
-            <a:r>
-              <a:rPr lang="da-DK" sz="2000" b="1">
-                <a:latin typeface="Consolas" panose="020B0609020204030204" pitchFamily="49" charset="0"/>
-              </a:rPr>
-              <a:t> </a:t>
-            </a:r>
-            <a:r>
-              <a:rPr lang="da-DK" sz="2000" b="1">
-                <a:latin typeface="Consolas" panose="020B0609020204030204" pitchFamily="49" charset="0"/>
-              </a:rPr>
-              <a:t>fb</a:t>
-            </a:r>
-            <a:r>
-              <a:rPr lang="da-DK" sz="2000" b="1" smtClean="0">
-                <a:latin typeface="Consolas" panose="020B0609020204030204" pitchFamily="49" charset="0"/>
-              </a:rPr>
-              <a:t>)</a:t>
-            </a:r>
-          </a:p>
-          <a:p>
-            <a:r>
-              <a:rPr lang="da-DK" sz="2000" b="1">
-                <a:latin typeface="Consolas" panose="020B0609020204030204" pitchFamily="49" charset="0"/>
-              </a:rPr>
-              <a:t>{</a:t>
-            </a:r>
-          </a:p>
-          <a:p>
-            <a:r>
-              <a:rPr lang="da-DK" sz="2000" b="1">
-                <a:latin typeface="Consolas" panose="020B0609020204030204" pitchFamily="49" charset="0"/>
-              </a:rPr>
-              <a:t> </a:t>
-            </a:r>
-            <a:r>
-              <a:rPr lang="da-DK" sz="2000" b="1" smtClean="0">
-                <a:latin typeface="Consolas" panose="020B0609020204030204" pitchFamily="49" charset="0"/>
-              </a:rPr>
-              <a:t>  </a:t>
-            </a:r>
-            <a:r>
-              <a:rPr lang="da-DK" sz="2000" b="1">
-                <a:solidFill>
-                  <a:srgbClr val="0070C0"/>
-                </a:solidFill>
-                <a:latin typeface="Consolas" panose="020B0609020204030204" pitchFamily="49" charset="0"/>
-              </a:rPr>
-              <a:t>int</a:t>
-            </a:r>
-            <a:r>
-              <a:rPr lang="da-DK" sz="2000" b="1" smtClean="0">
-                <a:latin typeface="Consolas" panose="020B0609020204030204" pitchFamily="49" charset="0"/>
-              </a:rPr>
-              <a:t> </a:t>
-            </a:r>
-            <a:r>
-              <a:rPr lang="da-DK" sz="2000" b="1">
-                <a:latin typeface="Consolas" panose="020B0609020204030204" pitchFamily="49" charset="0"/>
-              </a:rPr>
-              <a:t>percent = GeneratePercent();</a:t>
-            </a:r>
-          </a:p>
-          <a:p>
-            <a:r>
-              <a:rPr lang="en-US" sz="2000" b="1" smtClean="0">
-                <a:latin typeface="Consolas" panose="020B0609020204030204" pitchFamily="49" charset="0"/>
-              </a:rPr>
-              <a:t>   </a:t>
-            </a:r>
-            <a:r>
-              <a:rPr lang="en-US" sz="2000" b="1">
-                <a:solidFill>
-                  <a:schemeClr val="accent6">
-                    <a:lumMod val="75000"/>
-                  </a:schemeClr>
-                </a:solidFill>
-                <a:latin typeface="Consolas" panose="020B0609020204030204" pitchFamily="49" charset="0"/>
-              </a:rPr>
-              <a:t>Fighter</a:t>
-            </a:r>
-            <a:r>
-              <a:rPr lang="en-US" sz="2000" b="1" smtClean="0">
-                <a:latin typeface="Consolas" panose="020B0609020204030204" pitchFamily="49" charset="0"/>
-              </a:rPr>
-              <a:t> </a:t>
-            </a:r>
-            <a:r>
-              <a:rPr lang="en-US" sz="2000" b="1">
-                <a:latin typeface="Consolas" panose="020B0609020204030204" pitchFamily="49" charset="0"/>
-              </a:rPr>
-              <a:t>first = percent &gt; 50 ? fa : fb;</a:t>
-            </a:r>
-          </a:p>
-          <a:p>
-            <a:r>
-              <a:rPr lang="en-US" sz="2000" b="1" smtClean="0">
-                <a:latin typeface="Consolas" panose="020B0609020204030204" pitchFamily="49" charset="0"/>
-              </a:rPr>
-              <a:t>   </a:t>
-            </a:r>
-            <a:r>
-              <a:rPr lang="en-US" sz="2000" b="1">
-                <a:solidFill>
-                  <a:schemeClr val="accent6">
-                    <a:lumMod val="75000"/>
-                  </a:schemeClr>
-                </a:solidFill>
-                <a:latin typeface="Consolas" panose="020B0609020204030204" pitchFamily="49" charset="0"/>
-              </a:rPr>
-              <a:t>Fighter</a:t>
-            </a:r>
-            <a:r>
-              <a:rPr lang="en-US" sz="2000" b="1" smtClean="0">
-                <a:latin typeface="Consolas" panose="020B0609020204030204" pitchFamily="49" charset="0"/>
-              </a:rPr>
-              <a:t> </a:t>
-            </a:r>
-            <a:r>
-              <a:rPr lang="en-US" sz="2000" b="1">
-                <a:latin typeface="Consolas" panose="020B0609020204030204" pitchFamily="49" charset="0"/>
-              </a:rPr>
-              <a:t>last = percent &gt; 50 ? fb : fa;</a:t>
-            </a:r>
-          </a:p>
-          <a:p>
-            <a:endParaRPr lang="da-DK" sz="2000" b="1">
-              <a:latin typeface="Consolas" panose="020B0609020204030204" pitchFamily="49" charset="0"/>
-            </a:endParaRPr>
-          </a:p>
-          <a:p>
-            <a:r>
-              <a:rPr lang="da-DK" sz="2000" b="1" smtClean="0">
-                <a:latin typeface="Consolas" panose="020B0609020204030204" pitchFamily="49" charset="0"/>
-              </a:rPr>
-              <a:t>   last.ReceiveDamage(first.DealDamage</a:t>
-            </a:r>
-            <a:r>
-              <a:rPr lang="da-DK" sz="2000" b="1">
-                <a:latin typeface="Consolas" panose="020B0609020204030204" pitchFamily="49" charset="0"/>
-              </a:rPr>
-              <a:t>());</a:t>
-            </a:r>
-          </a:p>
-          <a:p>
-            <a:r>
-              <a:rPr lang="da-DK" sz="2000" b="1" smtClean="0">
-                <a:latin typeface="Consolas" panose="020B0609020204030204" pitchFamily="49" charset="0"/>
-              </a:rPr>
-              <a:t>   </a:t>
-            </a:r>
-            <a:r>
-              <a:rPr lang="da-DK" sz="2000" b="1">
-                <a:solidFill>
-                  <a:srgbClr val="0070C0"/>
-                </a:solidFill>
-                <a:latin typeface="Consolas" panose="020B0609020204030204" pitchFamily="49" charset="0"/>
-              </a:rPr>
-              <a:t>if</a:t>
-            </a:r>
-            <a:r>
-              <a:rPr lang="da-DK" sz="2000" b="1" smtClean="0">
-                <a:latin typeface="Consolas" panose="020B0609020204030204" pitchFamily="49" charset="0"/>
-              </a:rPr>
-              <a:t> </a:t>
-            </a:r>
-            <a:r>
-              <a:rPr lang="da-DK" sz="2000" b="1">
-                <a:latin typeface="Consolas" panose="020B0609020204030204" pitchFamily="49" charset="0"/>
-              </a:rPr>
-              <a:t>(!last.Stop)</a:t>
-            </a:r>
-          </a:p>
-          <a:p>
-            <a:r>
-              <a:rPr lang="da-DK" sz="2000" b="1">
-                <a:latin typeface="Consolas" panose="020B0609020204030204" pitchFamily="49" charset="0"/>
-              </a:rPr>
-              <a:t>   </a:t>
-            </a:r>
-            <a:r>
-              <a:rPr lang="da-DK" sz="2000" b="1" smtClean="0">
-                <a:latin typeface="Consolas" panose="020B0609020204030204" pitchFamily="49" charset="0"/>
-              </a:rPr>
-              <a:t>{</a:t>
-            </a:r>
-            <a:endParaRPr lang="da-DK" sz="2000" b="1">
-              <a:latin typeface="Consolas" panose="020B0609020204030204" pitchFamily="49" charset="0"/>
-            </a:endParaRPr>
-          </a:p>
-          <a:p>
-            <a:r>
-              <a:rPr lang="da-DK" sz="2000" b="1" smtClean="0">
-                <a:latin typeface="Consolas" panose="020B0609020204030204" pitchFamily="49" charset="0"/>
-              </a:rPr>
-              <a:t>      first.ReceiveDamage(last.DealDamage</a:t>
-            </a:r>
-            <a:r>
-              <a:rPr lang="da-DK" sz="2000" b="1">
-                <a:latin typeface="Consolas" panose="020B0609020204030204" pitchFamily="49" charset="0"/>
-              </a:rPr>
-              <a:t>());</a:t>
-            </a:r>
-          </a:p>
-          <a:p>
-            <a:r>
-              <a:rPr lang="da-DK" sz="2000" b="1" smtClean="0">
-                <a:latin typeface="Consolas" panose="020B0609020204030204" pitchFamily="49" charset="0"/>
-              </a:rPr>
-              <a:t>   }</a:t>
-            </a:r>
-            <a:endParaRPr lang="da-DK" sz="2000" b="1">
-              <a:latin typeface="Consolas" panose="020B0609020204030204" pitchFamily="49" charset="0"/>
-            </a:endParaRPr>
-          </a:p>
-          <a:p>
-            <a:r>
-              <a:rPr lang="da-DK" sz="2000" b="1">
-                <a:latin typeface="Consolas" panose="020B0609020204030204" pitchFamily="49" charset="0"/>
-              </a:rPr>
-              <a:t>}</a:t>
-            </a:r>
-            <a:endParaRPr lang="da-DK" sz="2000" b="1">
-              <a:latin typeface="Consolas" panose="020B0609020204030204" pitchFamily="49" charset="0"/>
-            </a:endParaRPr>
-          </a:p>
-        </p:txBody>
-      </p:sp>
-    </p:spTree>
-    <p:extLst>
-      <p:ext uri="{BB962C8B-B14F-4D97-AF65-F5344CB8AC3E}">
-        <p14:creationId xmlns:p14="http://schemas.microsoft.com/office/powerpoint/2010/main" val="1541401097"/>
-      </p:ext>
-    </p:extLst>
-  </p:cSld>
-  <p:clrMapOvr>
-    <a:masterClrMapping/>
-  </p:clrMapOvr>
-  <mc:AlternateContent xmlns:mc="http://schemas.openxmlformats.org/markup-compatibility/2006" xmlns:p14="http://schemas.microsoft.com/office/powerpoint/2010/main">
-    <mc:Choice Requires="p14">
-      <p:transition p14:dur="0"/>
-    </mc:Choice>
-    <mc:Fallback xmlns="">
-      <p:transition/>
-    </mc:Fallback>
-  </mc:AlternateContent>
-  <p:timing>
-    <p:tnLst>
-      <p:par>
-        <p:cTn id="1" dur="indefinite" restart="never" nodeType="tmRoot"/>
-      </p:par>
-    </p:tnLst>
-  </p:timing>
-</p:sld>
-</file>
-
-<file path=ppt/slides/slide21.xml><?xml version="1.0" encoding="utf-8"?>
-<p:sld xmlns:a="http://schemas.openxmlformats.org/drawingml/2006/main" xmlns:r="http://schemas.openxmlformats.org/officeDocument/2006/relationships" xmlns:p="http://schemas.openxmlformats.org/presentationml/2006/main">
-  <p:cSld>
-    <p:spTree>
-      <p:nvGrpSpPr>
-        <p:cNvPr id="1" name=""/>
-        <p:cNvGrpSpPr/>
-        <p:nvPr/>
-      </p:nvGrpSpPr>
-      <p:grpSpPr>
-        <a:xfrm>
-          <a:off x="0" y="0"/>
-          <a:ext cx="0" cy="0"/>
-          <a:chOff x="0" y="0"/>
-          <a:chExt cx="0" cy="0"/>
-        </a:xfrm>
-      </p:grpSpPr>
-      <p:sp>
-        <p:nvSpPr>
-          <p:cNvPr id="3" name="Tekstfelt 2"/>
-          <p:cNvSpPr txBox="1"/>
-          <p:nvPr/>
-        </p:nvSpPr>
-        <p:spPr>
-          <a:xfrm>
-            <a:off x="962526" y="1012925"/>
-            <a:ext cx="10160669" cy="1631216"/>
-          </a:xfrm>
-          <a:prstGeom prst="rect">
-            <a:avLst/>
-          </a:prstGeom>
-          <a:noFill/>
-        </p:spPr>
-        <p:txBody>
-          <a:bodyPr wrap="square" rtlCol="0">
-            <a:spAutoFit/>
-          </a:bodyPr>
-          <a:lstStyle/>
-          <a:p>
-            <a:r>
-              <a:rPr lang="da-DK" sz="2000" b="1" smtClean="0">
-                <a:solidFill>
-                  <a:srgbClr val="0070C0"/>
-                </a:solidFill>
-                <a:latin typeface="Consolas" panose="020B0609020204030204" pitchFamily="49" charset="0"/>
-              </a:rPr>
-              <a:t>protected override void </a:t>
-            </a:r>
-            <a:r>
-              <a:rPr lang="da-DK" sz="2000" b="1" smtClean="0">
-                <a:latin typeface="Consolas" panose="020B0609020204030204" pitchFamily="49" charset="0"/>
-              </a:rPr>
-              <a:t>Report(</a:t>
-            </a:r>
-            <a:r>
-              <a:rPr lang="da-DK" sz="2000" b="1">
-                <a:solidFill>
-                  <a:srgbClr val="0070C0"/>
-                </a:solidFill>
-                <a:latin typeface="Consolas" panose="020B0609020204030204" pitchFamily="49" charset="0"/>
-              </a:rPr>
-              <a:t>int</a:t>
-            </a:r>
-            <a:r>
-              <a:rPr lang="da-DK" sz="2000" b="1" smtClean="0">
-                <a:latin typeface="Consolas" panose="020B0609020204030204" pitchFamily="49" charset="0"/>
-              </a:rPr>
-              <a:t> winsA, </a:t>
-            </a:r>
-            <a:r>
-              <a:rPr lang="da-DK" sz="2000" b="1">
-                <a:solidFill>
-                  <a:srgbClr val="0070C0"/>
-                </a:solidFill>
-                <a:latin typeface="Consolas" panose="020B0609020204030204" pitchFamily="49" charset="0"/>
-              </a:rPr>
-              <a:t>int</a:t>
-            </a:r>
-            <a:r>
-              <a:rPr lang="da-DK" sz="2000" b="1" smtClean="0">
-                <a:latin typeface="Consolas" panose="020B0609020204030204" pitchFamily="49" charset="0"/>
-              </a:rPr>
-              <a:t> winsB)</a:t>
-            </a:r>
-          </a:p>
-          <a:p>
-            <a:r>
-              <a:rPr lang="da-DK" sz="2000" b="1" smtClean="0">
-                <a:latin typeface="Consolas" panose="020B0609020204030204" pitchFamily="49" charset="0"/>
-              </a:rPr>
-              <a:t>{</a:t>
-            </a:r>
-          </a:p>
-          <a:p>
-            <a:r>
-              <a:rPr lang="en-US" sz="2000" b="1">
-                <a:latin typeface="Consolas" panose="020B0609020204030204" pitchFamily="49" charset="0"/>
-              </a:rPr>
-              <a:t> </a:t>
-            </a:r>
-            <a:r>
-              <a:rPr lang="en-US" sz="2000" b="1" smtClean="0">
-                <a:latin typeface="Consolas" panose="020B0609020204030204" pitchFamily="49" charset="0"/>
-              </a:rPr>
-              <a:t>  Console.WriteLine</a:t>
-            </a:r>
-            <a:r>
-              <a:rPr lang="en-US" sz="2000" b="1">
-                <a:latin typeface="Consolas" panose="020B0609020204030204" pitchFamily="49" charset="0"/>
-              </a:rPr>
-              <a:t>(</a:t>
-            </a:r>
-            <a:r>
-              <a:rPr lang="en-US" sz="2000" b="1">
-                <a:solidFill>
-                  <a:srgbClr val="C00000"/>
-                </a:solidFill>
-                <a:latin typeface="Consolas" panose="020B0609020204030204" pitchFamily="49" charset="0"/>
-              </a:rPr>
-              <a:t>$"Fair Fight Club results: "</a:t>
-            </a:r>
-            <a:r>
-              <a:rPr lang="en-US" sz="2000" b="1">
-                <a:latin typeface="Consolas" panose="020B0609020204030204" pitchFamily="49" charset="0"/>
-              </a:rPr>
-              <a:t>);</a:t>
-            </a:r>
-          </a:p>
-          <a:p>
-            <a:r>
-              <a:rPr lang="da-DK" sz="2000" b="1" smtClean="0">
-                <a:latin typeface="Consolas" panose="020B0609020204030204" pitchFamily="49" charset="0"/>
-              </a:rPr>
-              <a:t>   </a:t>
-            </a:r>
-            <a:r>
-              <a:rPr lang="da-DK" sz="2000" b="1">
-                <a:solidFill>
-                  <a:srgbClr val="0070C0"/>
-                </a:solidFill>
-                <a:latin typeface="Consolas" panose="020B0609020204030204" pitchFamily="49" charset="0"/>
-              </a:rPr>
-              <a:t>base</a:t>
-            </a:r>
-            <a:r>
-              <a:rPr lang="da-DK" sz="2000" b="1" smtClean="0">
-                <a:latin typeface="Consolas" panose="020B0609020204030204" pitchFamily="49" charset="0"/>
-              </a:rPr>
-              <a:t>.Report(winsA</a:t>
-            </a:r>
-            <a:r>
-              <a:rPr lang="da-DK" sz="2000" b="1">
-                <a:latin typeface="Consolas" panose="020B0609020204030204" pitchFamily="49" charset="0"/>
-              </a:rPr>
-              <a:t>, winsB);</a:t>
-            </a:r>
-          </a:p>
-          <a:p>
-            <a:r>
-              <a:rPr lang="da-DK" sz="2000" b="1" smtClean="0">
-                <a:latin typeface="Consolas" panose="020B0609020204030204" pitchFamily="49" charset="0"/>
-              </a:rPr>
-              <a:t>}</a:t>
-            </a:r>
-            <a:endParaRPr lang="da-DK" sz="2000" b="1">
-              <a:latin typeface="Consolas" panose="020B0609020204030204" pitchFamily="49" charset="0"/>
-            </a:endParaRPr>
-          </a:p>
-        </p:txBody>
-      </p:sp>
-    </p:spTree>
-    <p:extLst>
-      <p:ext uri="{BB962C8B-B14F-4D97-AF65-F5344CB8AC3E}">
-        <p14:creationId xmlns:p14="http://schemas.microsoft.com/office/powerpoint/2010/main" val="1618432360"/>
-      </p:ext>
-    </p:extLst>
-  </p:cSld>
-  <p:clrMapOvr>
-    <a:masterClrMapping/>
-  </p:clrMapOvr>
-  <mc:AlternateContent xmlns:mc="http://schemas.openxmlformats.org/markup-compatibility/2006" xmlns:p14="http://schemas.microsoft.com/office/powerpoint/2010/main">
-    <mc:Choice Requires="p14">
-      <p:transition p14:dur="0"/>
-    </mc:Choice>
-    <mc:Fallback xmlns="">
-      <p:transition/>
-    </mc:Fallback>
-  </mc:AlternateContent>
-  <p:timing>
-    <p:tnLst>
-      <p:par>
-        <p:cTn id="1" dur="indefinite" restart="never" nodeType="tmRoot"/>
-      </p:par>
-    </p:tnLst>
-  </p:timing>
-</p:sld>
-</file>
-
-<file path=ppt/slides/slide22.xml><?xml version="1.0" encoding="utf-8"?>
 <p:sld xmlns:a="http://schemas.openxmlformats.org/drawingml/2006/main" xmlns:r="http://schemas.openxmlformats.org/officeDocument/2006/relationships" xmlns:p="http://schemas.openxmlformats.org/presentationml/2006/main">
   <p:cSld>
     <p:spTree>
@@ -7155,7 +6330,6 @@
               <a:rPr lang="da-DK" sz="3600" smtClean="0"/>
               <a:t>Fighter</a:t>
             </a:r>
-            <a:endParaRPr lang="da-DK" sz="3600" smtClean="0"/>
           </a:p>
         </p:txBody>
       </p:sp>
@@ -7209,7 +6383,6 @@
               <a:rPr lang="da-DK" sz="3600" smtClean="0"/>
               <a:t>Club</a:t>
             </a:r>
-            <a:endParaRPr lang="da-DK" sz="3600" smtClean="0"/>
           </a:p>
         </p:txBody>
       </p:sp>
@@ -7273,11 +6446,6 @@
               </a:rPr>
               <a:t>Club</a:t>
             </a:r>
-            <a:endParaRPr lang="da-DK" sz="3600" smtClean="0">
-              <a:solidFill>
-                <a:srgbClr val="FFFF00"/>
-              </a:solidFill>
-            </a:endParaRPr>
           </a:p>
         </p:txBody>
       </p:sp>
@@ -7506,7 +6674,6 @@
               <a:rPr lang="da-DK" sz="2800" smtClean="0"/>
               <a:t>Fair</a:t>
             </a:r>
-            <a:endParaRPr lang="da-DK" sz="2800" smtClean="0"/>
           </a:p>
         </p:txBody>
       </p:sp>
@@ -7550,108 +6717,546 @@
           </a:fontRef>
         </p:style>
       </p:cxnSp>
-      <p:cxnSp>
-        <p:nvCxnSpPr>
-          <p:cNvPr id="14" name="Vinklet forbindelse 2"/>
-          <p:cNvCxnSpPr/>
-          <p:nvPr/>
-        </p:nvCxnSpPr>
-        <p:spPr>
-          <a:xfrm flipH="1">
-            <a:off x="6045868" y="2975369"/>
-            <a:ext cx="1395664" cy="712310"/>
-          </a:xfrm>
-          <a:prstGeom prst="straightConnector1">
-            <a:avLst/>
-          </a:prstGeom>
-          <a:ln w="76200">
-            <a:solidFill>
-              <a:schemeClr val="tx1"/>
-            </a:solidFill>
-            <a:headEnd w="lg" len="lg"/>
-            <a:tailEnd type="triangle" w="lg" len="lg"/>
-          </a:ln>
-        </p:spPr>
-        <p:style>
-          <a:lnRef idx="1">
-            <a:schemeClr val="accent1"/>
-          </a:lnRef>
-          <a:fillRef idx="0">
-            <a:schemeClr val="accent1"/>
-          </a:fillRef>
-          <a:effectRef idx="0">
-            <a:schemeClr val="accent1"/>
-          </a:effectRef>
-          <a:fontRef idx="minor">
-            <a:schemeClr val="tx1"/>
-          </a:fontRef>
-        </p:style>
-      </p:cxnSp>
+    </p:spTree>
+    <p:extLst>
+      <p:ext uri="{BB962C8B-B14F-4D97-AF65-F5344CB8AC3E}">
+        <p14:creationId xmlns:p14="http://schemas.microsoft.com/office/powerpoint/2010/main" val="1127353810"/>
+      </p:ext>
+    </p:extLst>
+  </p:cSld>
+  <p:clrMapOvr>
+    <a:masterClrMapping/>
+  </p:clrMapOvr>
+  <mc:AlternateContent xmlns:mc="http://schemas.openxmlformats.org/markup-compatibility/2006">
+    <mc:Choice xmlns:p14="http://schemas.microsoft.com/office/powerpoint/2010/main" Requires="p14">
+      <p:transition spd="med" p14:dur="700">
+        <p:fade/>
+      </p:transition>
+    </mc:Choice>
+    <mc:Fallback>
+      <p:transition spd="med">
+        <p:fade/>
+      </p:transition>
+    </mc:Fallback>
+  </mc:AlternateContent>
+  <p:timing>
+    <p:tnLst>
+      <p:par>
+        <p:cTn id="1" dur="indefinite" restart="never" nodeType="tmRoot"/>
+      </p:par>
+    </p:tnLst>
+  </p:timing>
+</p:sld>
+</file>
+
+<file path=ppt/slides/slide21.xml><?xml version="1.0" encoding="utf-8"?>
+<p:sld xmlns:a="http://schemas.openxmlformats.org/drawingml/2006/main" xmlns:r="http://schemas.openxmlformats.org/officeDocument/2006/relationships" xmlns:p="http://schemas.openxmlformats.org/presentationml/2006/main">
+  <p:cSld>
+    <p:spTree>
+      <p:nvGrpSpPr>
+        <p:cNvPr id="1" name=""/>
+        <p:cNvGrpSpPr/>
+        <p:nvPr/>
+      </p:nvGrpSpPr>
+      <p:grpSpPr>
+        <a:xfrm>
+          <a:off x="0" y="0"/>
+          <a:ext cx="0" cy="0"/>
+          <a:chOff x="0" y="0"/>
+          <a:chExt cx="0" cy="0"/>
+        </a:xfrm>
+      </p:grpSpPr>
       <p:sp>
         <p:nvSpPr>
-          <p:cNvPr id="13" name="Afrundet rektangel 12"/>
-          <p:cNvSpPr/>
+          <p:cNvPr id="3" name="Tekstfelt 2"/>
+          <p:cNvSpPr txBox="1"/>
           <p:nvPr/>
         </p:nvSpPr>
         <p:spPr>
           <a:xfrm>
-            <a:off x="7363050" y="1645733"/>
-            <a:ext cx="1800460" cy="1424323"/>
+            <a:off x="962526" y="1012925"/>
+            <a:ext cx="10160669" cy="3785652"/>
           </a:xfrm>
-          <a:prstGeom prst="roundRect">
+          <a:prstGeom prst="rect">
             <a:avLst/>
           </a:prstGeom>
-          <a:solidFill>
-            <a:srgbClr val="C00000"/>
-          </a:solidFill>
+          <a:noFill/>
         </p:spPr>
-        <p:style>
-          <a:lnRef idx="2">
-            <a:schemeClr val="accent1">
-              <a:shade val="50000"/>
-            </a:schemeClr>
-          </a:lnRef>
-          <a:fillRef idx="1">
-            <a:schemeClr val="accent1"/>
-          </a:fillRef>
-          <a:effectRef idx="0">
-            <a:schemeClr val="accent1"/>
-          </a:effectRef>
-          <a:fontRef idx="minor">
-            <a:schemeClr val="lt1"/>
-          </a:fontRef>
-        </p:style>
         <p:txBody>
-          <a:bodyPr rtlCol="0" anchor="t"/>
+          <a:bodyPr wrap="square" rtlCol="0">
+            <a:spAutoFit/>
+          </a:bodyPr>
           <a:lstStyle/>
           <a:p>
-            <a:pPr algn="ctr"/>
-            <a:r>
-              <a:rPr lang="da-DK" sz="2800" smtClean="0"/>
-              <a:t>Fight</a:t>
-            </a:r>
-          </a:p>
-          <a:p>
-            <a:pPr algn="ctr"/>
-            <a:r>
-              <a:rPr lang="da-DK" sz="2800" smtClean="0"/>
-              <a:t>Club</a:t>
-            </a:r>
-          </a:p>
-          <a:p>
-            <a:pPr algn="ctr"/>
-            <a:r>
-              <a:rPr lang="da-DK" sz="2800" smtClean="0"/>
-              <a:t>BiasedA</a:t>
-            </a:r>
-            <a:endParaRPr lang="da-DK" sz="2800" smtClean="0"/>
+            <a:r>
+              <a:rPr lang="da-DK" sz="2000" b="1" smtClean="0">
+                <a:solidFill>
+                  <a:srgbClr val="0070C0"/>
+                </a:solidFill>
+                <a:latin typeface="Consolas" panose="020B0609020204030204" pitchFamily="49" charset="0"/>
+              </a:rPr>
+              <a:t>protected override void </a:t>
+            </a:r>
+            <a:r>
+              <a:rPr lang="da-DK" sz="2000" b="1" smtClean="0">
+                <a:latin typeface="Consolas" panose="020B0609020204030204" pitchFamily="49" charset="0"/>
+              </a:rPr>
+              <a:t>ExchangeBlows(</a:t>
+            </a:r>
+            <a:r>
+              <a:rPr lang="da-DK" sz="2000" b="1" smtClean="0">
+                <a:solidFill>
+                  <a:schemeClr val="accent6">
+                    <a:lumMod val="75000"/>
+                  </a:schemeClr>
+                </a:solidFill>
+                <a:latin typeface="Consolas" panose="020B0609020204030204" pitchFamily="49" charset="0"/>
+              </a:rPr>
+              <a:t>Fighter</a:t>
+            </a:r>
+            <a:r>
+              <a:rPr lang="da-DK" sz="2000" b="1" smtClean="0">
+                <a:latin typeface="Consolas" panose="020B0609020204030204" pitchFamily="49" charset="0"/>
+              </a:rPr>
+              <a:t> </a:t>
+            </a:r>
+            <a:r>
+              <a:rPr lang="da-DK" sz="2000" b="1">
+                <a:latin typeface="Consolas" panose="020B0609020204030204" pitchFamily="49" charset="0"/>
+              </a:rPr>
+              <a:t>fa,</a:t>
+            </a:r>
+            <a:r>
+              <a:rPr lang="da-DK" sz="2000" b="1">
+                <a:solidFill>
+                  <a:schemeClr val="accent6">
+                    <a:lumMod val="75000"/>
+                  </a:schemeClr>
+                </a:solidFill>
+                <a:latin typeface="Consolas" panose="020B0609020204030204" pitchFamily="49" charset="0"/>
+              </a:rPr>
+              <a:t> Fighter</a:t>
+            </a:r>
+            <a:r>
+              <a:rPr lang="da-DK" sz="2000" b="1">
+                <a:latin typeface="Consolas" panose="020B0609020204030204" pitchFamily="49" charset="0"/>
+              </a:rPr>
+              <a:t> fb</a:t>
+            </a:r>
+            <a:r>
+              <a:rPr lang="da-DK" sz="2000" b="1" smtClean="0">
+                <a:latin typeface="Consolas" panose="020B0609020204030204" pitchFamily="49" charset="0"/>
+              </a:rPr>
+              <a:t>)</a:t>
+            </a:r>
+          </a:p>
+          <a:p>
+            <a:r>
+              <a:rPr lang="da-DK" sz="2000" b="1">
+                <a:latin typeface="Consolas" panose="020B0609020204030204" pitchFamily="49" charset="0"/>
+              </a:rPr>
+              <a:t>{</a:t>
+            </a:r>
+          </a:p>
+          <a:p>
+            <a:r>
+              <a:rPr lang="da-DK" sz="2000" b="1">
+                <a:latin typeface="Consolas" panose="020B0609020204030204" pitchFamily="49" charset="0"/>
+              </a:rPr>
+              <a:t> </a:t>
+            </a:r>
+            <a:r>
+              <a:rPr lang="da-DK" sz="2000" b="1" smtClean="0">
+                <a:latin typeface="Consolas" panose="020B0609020204030204" pitchFamily="49" charset="0"/>
+              </a:rPr>
+              <a:t>  </a:t>
+            </a:r>
+            <a:r>
+              <a:rPr lang="da-DK" sz="2000" b="1">
+                <a:solidFill>
+                  <a:srgbClr val="0070C0"/>
+                </a:solidFill>
+                <a:latin typeface="Consolas" panose="020B0609020204030204" pitchFamily="49" charset="0"/>
+              </a:rPr>
+              <a:t>int</a:t>
+            </a:r>
+            <a:r>
+              <a:rPr lang="da-DK" sz="2000" b="1" smtClean="0">
+                <a:latin typeface="Consolas" panose="020B0609020204030204" pitchFamily="49" charset="0"/>
+              </a:rPr>
+              <a:t> </a:t>
+            </a:r>
+            <a:r>
+              <a:rPr lang="da-DK" sz="2000" b="1">
+                <a:latin typeface="Consolas" panose="020B0609020204030204" pitchFamily="49" charset="0"/>
+              </a:rPr>
+              <a:t>percent = GeneratePercent();</a:t>
+            </a:r>
+          </a:p>
+          <a:p>
+            <a:r>
+              <a:rPr lang="en-US" sz="2000" b="1" smtClean="0">
+                <a:latin typeface="Consolas" panose="020B0609020204030204" pitchFamily="49" charset="0"/>
+              </a:rPr>
+              <a:t>   </a:t>
+            </a:r>
+            <a:r>
+              <a:rPr lang="en-US" sz="2000" b="1">
+                <a:solidFill>
+                  <a:schemeClr val="accent6">
+                    <a:lumMod val="75000"/>
+                  </a:schemeClr>
+                </a:solidFill>
+                <a:latin typeface="Consolas" panose="020B0609020204030204" pitchFamily="49" charset="0"/>
+              </a:rPr>
+              <a:t>Fighter</a:t>
+            </a:r>
+            <a:r>
+              <a:rPr lang="en-US" sz="2000" b="1" smtClean="0">
+                <a:latin typeface="Consolas" panose="020B0609020204030204" pitchFamily="49" charset="0"/>
+              </a:rPr>
+              <a:t> </a:t>
+            </a:r>
+            <a:r>
+              <a:rPr lang="en-US" sz="2000" b="1">
+                <a:latin typeface="Consolas" panose="020B0609020204030204" pitchFamily="49" charset="0"/>
+              </a:rPr>
+              <a:t>first = percent &gt; 50 ? fa : fb;</a:t>
+            </a:r>
+          </a:p>
+          <a:p>
+            <a:r>
+              <a:rPr lang="en-US" sz="2000" b="1" smtClean="0">
+                <a:latin typeface="Consolas" panose="020B0609020204030204" pitchFamily="49" charset="0"/>
+              </a:rPr>
+              <a:t>   </a:t>
+            </a:r>
+            <a:r>
+              <a:rPr lang="en-US" sz="2000" b="1">
+                <a:solidFill>
+                  <a:schemeClr val="accent6">
+                    <a:lumMod val="75000"/>
+                  </a:schemeClr>
+                </a:solidFill>
+                <a:latin typeface="Consolas" panose="020B0609020204030204" pitchFamily="49" charset="0"/>
+              </a:rPr>
+              <a:t>Fighter</a:t>
+            </a:r>
+            <a:r>
+              <a:rPr lang="en-US" sz="2000" b="1" smtClean="0">
+                <a:latin typeface="Consolas" panose="020B0609020204030204" pitchFamily="49" charset="0"/>
+              </a:rPr>
+              <a:t> </a:t>
+            </a:r>
+            <a:r>
+              <a:rPr lang="en-US" sz="2000" b="1">
+                <a:latin typeface="Consolas" panose="020B0609020204030204" pitchFamily="49" charset="0"/>
+              </a:rPr>
+              <a:t>last = percent &gt; 50 ? fb : fa;</a:t>
+            </a:r>
+          </a:p>
+          <a:p>
+            <a:endParaRPr lang="da-DK" sz="2000" b="1">
+              <a:latin typeface="Consolas" panose="020B0609020204030204" pitchFamily="49" charset="0"/>
+            </a:endParaRPr>
+          </a:p>
+          <a:p>
+            <a:r>
+              <a:rPr lang="da-DK" sz="2000" b="1" smtClean="0">
+                <a:latin typeface="Consolas" panose="020B0609020204030204" pitchFamily="49" charset="0"/>
+              </a:rPr>
+              <a:t>   last.ReceiveDamage(first.DealDamage</a:t>
+            </a:r>
+            <a:r>
+              <a:rPr lang="da-DK" sz="2000" b="1">
+                <a:latin typeface="Consolas" panose="020B0609020204030204" pitchFamily="49" charset="0"/>
+              </a:rPr>
+              <a:t>());</a:t>
+            </a:r>
+          </a:p>
+          <a:p>
+            <a:r>
+              <a:rPr lang="da-DK" sz="2000" b="1" smtClean="0">
+                <a:latin typeface="Consolas" panose="020B0609020204030204" pitchFamily="49" charset="0"/>
+              </a:rPr>
+              <a:t>   </a:t>
+            </a:r>
+            <a:r>
+              <a:rPr lang="da-DK" sz="2000" b="1">
+                <a:solidFill>
+                  <a:srgbClr val="0070C0"/>
+                </a:solidFill>
+                <a:latin typeface="Consolas" panose="020B0609020204030204" pitchFamily="49" charset="0"/>
+              </a:rPr>
+              <a:t>if</a:t>
+            </a:r>
+            <a:r>
+              <a:rPr lang="da-DK" sz="2000" b="1" smtClean="0">
+                <a:latin typeface="Consolas" panose="020B0609020204030204" pitchFamily="49" charset="0"/>
+              </a:rPr>
+              <a:t> </a:t>
+            </a:r>
+            <a:r>
+              <a:rPr lang="da-DK" sz="2000" b="1">
+                <a:latin typeface="Consolas" panose="020B0609020204030204" pitchFamily="49" charset="0"/>
+              </a:rPr>
+              <a:t>(!last.Stop)</a:t>
+            </a:r>
+          </a:p>
+          <a:p>
+            <a:r>
+              <a:rPr lang="da-DK" sz="2000" b="1">
+                <a:latin typeface="Consolas" panose="020B0609020204030204" pitchFamily="49" charset="0"/>
+              </a:rPr>
+              <a:t>   </a:t>
+            </a:r>
+            <a:r>
+              <a:rPr lang="da-DK" sz="2000" b="1" smtClean="0">
+                <a:latin typeface="Consolas" panose="020B0609020204030204" pitchFamily="49" charset="0"/>
+              </a:rPr>
+              <a:t>{</a:t>
+            </a:r>
+            <a:endParaRPr lang="da-DK" sz="2000" b="1">
+              <a:latin typeface="Consolas" panose="020B0609020204030204" pitchFamily="49" charset="0"/>
+            </a:endParaRPr>
+          </a:p>
+          <a:p>
+            <a:r>
+              <a:rPr lang="da-DK" sz="2000" b="1" smtClean="0">
+                <a:latin typeface="Consolas" panose="020B0609020204030204" pitchFamily="49" charset="0"/>
+              </a:rPr>
+              <a:t>      first.ReceiveDamage(last.DealDamage</a:t>
+            </a:r>
+            <a:r>
+              <a:rPr lang="da-DK" sz="2000" b="1">
+                <a:latin typeface="Consolas" panose="020B0609020204030204" pitchFamily="49" charset="0"/>
+              </a:rPr>
+              <a:t>());</a:t>
+            </a:r>
+          </a:p>
+          <a:p>
+            <a:r>
+              <a:rPr lang="da-DK" sz="2000" b="1" smtClean="0">
+                <a:latin typeface="Consolas" panose="020B0609020204030204" pitchFamily="49" charset="0"/>
+              </a:rPr>
+              <a:t>   }</a:t>
+            </a:r>
+            <a:endParaRPr lang="da-DK" sz="2000" b="1">
+              <a:latin typeface="Consolas" panose="020B0609020204030204" pitchFamily="49" charset="0"/>
+            </a:endParaRPr>
+          </a:p>
+          <a:p>
+            <a:r>
+              <a:rPr lang="da-DK" sz="2000" b="1">
+                <a:latin typeface="Consolas" panose="020B0609020204030204" pitchFamily="49" charset="0"/>
+              </a:rPr>
+              <a:t>}</a:t>
+            </a:r>
           </a:p>
         </p:txBody>
       </p:sp>
     </p:spTree>
     <p:extLst>
       <p:ext uri="{BB962C8B-B14F-4D97-AF65-F5344CB8AC3E}">
-        <p14:creationId xmlns:p14="http://schemas.microsoft.com/office/powerpoint/2010/main" val="1857849147"/>
+        <p14:creationId xmlns:p14="http://schemas.microsoft.com/office/powerpoint/2010/main" val="1541401097"/>
+      </p:ext>
+    </p:extLst>
+  </p:cSld>
+  <p:clrMapOvr>
+    <a:masterClrMapping/>
+  </p:clrMapOvr>
+  <mc:AlternateContent xmlns:mc="http://schemas.openxmlformats.org/markup-compatibility/2006" xmlns:p14="http://schemas.microsoft.com/office/powerpoint/2010/main">
+    <mc:Choice Requires="p14">
+      <p:transition p14:dur="0"/>
+    </mc:Choice>
+    <mc:Fallback xmlns="">
+      <p:transition/>
+    </mc:Fallback>
+  </mc:AlternateContent>
+  <p:timing>
+    <p:tnLst>
+      <p:par>
+        <p:cTn id="1" dur="indefinite" restart="never" nodeType="tmRoot"/>
+      </p:par>
+    </p:tnLst>
+  </p:timing>
+</p:sld>
+</file>
+
+<file path=ppt/slides/slide22.xml><?xml version="1.0" encoding="utf-8"?>
+<p:sld xmlns:a="http://schemas.openxmlformats.org/drawingml/2006/main" xmlns:r="http://schemas.openxmlformats.org/officeDocument/2006/relationships" xmlns:p="http://schemas.openxmlformats.org/presentationml/2006/main">
+  <p:cSld>
+    <p:spTree>
+      <p:nvGrpSpPr>
+        <p:cNvPr id="1" name=""/>
+        <p:cNvGrpSpPr/>
+        <p:nvPr/>
+      </p:nvGrpSpPr>
+      <p:grpSpPr>
+        <a:xfrm>
+          <a:off x="0" y="0"/>
+          <a:ext cx="0" cy="0"/>
+          <a:chOff x="0" y="0"/>
+          <a:chExt cx="0" cy="0"/>
+        </a:xfrm>
+      </p:grpSpPr>
+      <p:sp>
+        <p:nvSpPr>
+          <p:cNvPr id="3" name="Tekstfelt 2"/>
+          <p:cNvSpPr txBox="1"/>
+          <p:nvPr/>
+        </p:nvSpPr>
+        <p:spPr>
+          <a:xfrm>
+            <a:off x="962526" y="1012925"/>
+            <a:ext cx="10160669" cy="1631216"/>
+          </a:xfrm>
+          <a:prstGeom prst="rect">
+            <a:avLst/>
+          </a:prstGeom>
+          <a:noFill/>
+        </p:spPr>
+        <p:txBody>
+          <a:bodyPr wrap="square" rtlCol="0">
+            <a:spAutoFit/>
+          </a:bodyPr>
+          <a:lstStyle/>
+          <a:p>
+            <a:r>
+              <a:rPr lang="da-DK" sz="2000" b="1" smtClean="0">
+                <a:solidFill>
+                  <a:srgbClr val="0070C0"/>
+                </a:solidFill>
+                <a:latin typeface="Consolas" panose="020B0609020204030204" pitchFamily="49" charset="0"/>
+              </a:rPr>
+              <a:t>protected override void </a:t>
+            </a:r>
+            <a:r>
+              <a:rPr lang="da-DK" sz="2000" b="1" smtClean="0">
+                <a:latin typeface="Consolas" panose="020B0609020204030204" pitchFamily="49" charset="0"/>
+              </a:rPr>
+              <a:t>Report(</a:t>
+            </a:r>
+            <a:r>
+              <a:rPr lang="da-DK" sz="2000" b="1">
+                <a:solidFill>
+                  <a:srgbClr val="0070C0"/>
+                </a:solidFill>
+                <a:latin typeface="Consolas" panose="020B0609020204030204" pitchFamily="49" charset="0"/>
+              </a:rPr>
+              <a:t>int</a:t>
+            </a:r>
+            <a:r>
+              <a:rPr lang="da-DK" sz="2000" b="1" smtClean="0">
+                <a:latin typeface="Consolas" panose="020B0609020204030204" pitchFamily="49" charset="0"/>
+              </a:rPr>
+              <a:t> winsA, </a:t>
+            </a:r>
+            <a:r>
+              <a:rPr lang="da-DK" sz="2000" b="1">
+                <a:solidFill>
+                  <a:srgbClr val="0070C0"/>
+                </a:solidFill>
+                <a:latin typeface="Consolas" panose="020B0609020204030204" pitchFamily="49" charset="0"/>
+              </a:rPr>
+              <a:t>int</a:t>
+            </a:r>
+            <a:r>
+              <a:rPr lang="da-DK" sz="2000" b="1" smtClean="0">
+                <a:latin typeface="Consolas" panose="020B0609020204030204" pitchFamily="49" charset="0"/>
+              </a:rPr>
+              <a:t> winsB)</a:t>
+            </a:r>
+          </a:p>
+          <a:p>
+            <a:r>
+              <a:rPr lang="da-DK" sz="2000" b="1" smtClean="0">
+                <a:latin typeface="Consolas" panose="020B0609020204030204" pitchFamily="49" charset="0"/>
+              </a:rPr>
+              <a:t>{</a:t>
+            </a:r>
+          </a:p>
+          <a:p>
+            <a:r>
+              <a:rPr lang="en-US" sz="2000" b="1">
+                <a:latin typeface="Consolas" panose="020B0609020204030204" pitchFamily="49" charset="0"/>
+              </a:rPr>
+              <a:t> </a:t>
+            </a:r>
+            <a:r>
+              <a:rPr lang="en-US" sz="2000" b="1" smtClean="0">
+                <a:latin typeface="Consolas" panose="020B0609020204030204" pitchFamily="49" charset="0"/>
+              </a:rPr>
+              <a:t>  Console.WriteLine</a:t>
+            </a:r>
+            <a:r>
+              <a:rPr lang="en-US" sz="2000" b="1">
+                <a:latin typeface="Consolas" panose="020B0609020204030204" pitchFamily="49" charset="0"/>
+              </a:rPr>
+              <a:t>(</a:t>
+            </a:r>
+            <a:r>
+              <a:rPr lang="en-US" sz="2000" b="1">
+                <a:solidFill>
+                  <a:srgbClr val="C00000"/>
+                </a:solidFill>
+                <a:latin typeface="Consolas" panose="020B0609020204030204" pitchFamily="49" charset="0"/>
+              </a:rPr>
+              <a:t>$"Fair Fight Club results: "</a:t>
+            </a:r>
+            <a:r>
+              <a:rPr lang="en-US" sz="2000" b="1">
+                <a:latin typeface="Consolas" panose="020B0609020204030204" pitchFamily="49" charset="0"/>
+              </a:rPr>
+              <a:t>);</a:t>
+            </a:r>
+          </a:p>
+          <a:p>
+            <a:r>
+              <a:rPr lang="da-DK" sz="2000" b="1" smtClean="0">
+                <a:latin typeface="Consolas" panose="020B0609020204030204" pitchFamily="49" charset="0"/>
+              </a:rPr>
+              <a:t>   </a:t>
+            </a:r>
+            <a:r>
+              <a:rPr lang="da-DK" sz="2000" b="1">
+                <a:solidFill>
+                  <a:srgbClr val="0070C0"/>
+                </a:solidFill>
+                <a:latin typeface="Consolas" panose="020B0609020204030204" pitchFamily="49" charset="0"/>
+              </a:rPr>
+              <a:t>base</a:t>
+            </a:r>
+            <a:r>
+              <a:rPr lang="da-DK" sz="2000" b="1" smtClean="0">
+                <a:latin typeface="Consolas" panose="020B0609020204030204" pitchFamily="49" charset="0"/>
+              </a:rPr>
+              <a:t>.Report(winsA</a:t>
+            </a:r>
+            <a:r>
+              <a:rPr lang="da-DK" sz="2000" b="1">
+                <a:latin typeface="Consolas" panose="020B0609020204030204" pitchFamily="49" charset="0"/>
+              </a:rPr>
+              <a:t>, winsB);</a:t>
+            </a:r>
+          </a:p>
+          <a:p>
+            <a:r>
+              <a:rPr lang="da-DK" sz="2000" b="1" smtClean="0">
+                <a:latin typeface="Consolas" panose="020B0609020204030204" pitchFamily="49" charset="0"/>
+              </a:rPr>
+              <a:t>}</a:t>
+            </a:r>
+            <a:endParaRPr lang="da-DK" sz="2000" b="1">
+              <a:latin typeface="Consolas" panose="020B0609020204030204" pitchFamily="49" charset="0"/>
+            </a:endParaRPr>
+          </a:p>
+        </p:txBody>
+      </p:sp>
+    </p:spTree>
+    <p:extLst>
+      <p:ext uri="{BB962C8B-B14F-4D97-AF65-F5344CB8AC3E}">
+        <p14:creationId xmlns:p14="http://schemas.microsoft.com/office/powerpoint/2010/main" val="1618432360"/>
       </p:ext>
     </p:extLst>
   </p:cSld>
@@ -7693,6 +7298,1141 @@
           <a:chExt cx="0" cy="0"/>
         </a:xfrm>
       </p:grpSpPr>
+      <p:cxnSp>
+        <p:nvCxnSpPr>
+          <p:cNvPr id="16" name="Vinklet forbindelse 2"/>
+          <p:cNvCxnSpPr>
+            <a:stCxn id="6" idx="1"/>
+            <a:endCxn id="11" idx="3"/>
+          </p:cNvCxnSpPr>
+          <p:nvPr/>
+        </p:nvCxnSpPr>
+        <p:spPr>
+          <a:xfrm flipH="1" flipV="1">
+            <a:off x="2635028" y="4305006"/>
+            <a:ext cx="1682027" cy="1"/>
+          </a:xfrm>
+          <a:prstGeom prst="straightConnector1">
+            <a:avLst/>
+          </a:prstGeom>
+          <a:ln w="76200">
+            <a:solidFill>
+              <a:schemeClr val="tx1"/>
+            </a:solidFill>
+            <a:headEnd w="lg" len="lg"/>
+            <a:tailEnd type="arrow" w="lg" len="lg"/>
+          </a:ln>
+        </p:spPr>
+        <p:style>
+          <a:lnRef idx="1">
+            <a:schemeClr val="accent1"/>
+          </a:lnRef>
+          <a:fillRef idx="0">
+            <a:schemeClr val="accent1"/>
+          </a:fillRef>
+          <a:effectRef idx="0">
+            <a:schemeClr val="accent1"/>
+          </a:effectRef>
+          <a:fontRef idx="minor">
+            <a:schemeClr val="tx1"/>
+          </a:fontRef>
+        </p:style>
+      </p:cxnSp>
+      <p:sp>
+        <p:nvSpPr>
+          <p:cNvPr id="11" name="Afrundet rektangel 10"/>
+          <p:cNvSpPr/>
+          <p:nvPr/>
+        </p:nvSpPr>
+        <p:spPr>
+          <a:xfrm>
+            <a:off x="834568" y="3845957"/>
+            <a:ext cx="1800460" cy="918098"/>
+          </a:xfrm>
+          <a:prstGeom prst="roundRect">
+            <a:avLst/>
+          </a:prstGeom>
+          <a:solidFill>
+            <a:srgbClr val="C00000"/>
+          </a:solidFill>
+        </p:spPr>
+        <p:style>
+          <a:lnRef idx="2">
+            <a:schemeClr val="accent1">
+              <a:shade val="50000"/>
+            </a:schemeClr>
+          </a:lnRef>
+          <a:fillRef idx="1">
+            <a:schemeClr val="accent1"/>
+          </a:fillRef>
+          <a:effectRef idx="0">
+            <a:schemeClr val="accent1"/>
+          </a:effectRef>
+          <a:fontRef idx="minor">
+            <a:schemeClr val="lt1"/>
+          </a:fontRef>
+        </p:style>
+        <p:txBody>
+          <a:bodyPr rtlCol="0" anchor="t"/>
+          <a:lstStyle/>
+          <a:p>
+            <a:pPr algn="ctr"/>
+            <a:r>
+              <a:rPr lang="da-DK" sz="3600" smtClean="0"/>
+              <a:t>Fighter</a:t>
+            </a:r>
+          </a:p>
+        </p:txBody>
+      </p:sp>
+      <p:sp>
+        <p:nvSpPr>
+          <p:cNvPr id="6" name="Afrundet rektangel 5"/>
+          <p:cNvSpPr/>
+          <p:nvPr/>
+        </p:nvSpPr>
+        <p:spPr>
+          <a:xfrm>
+            <a:off x="4317055" y="3592845"/>
+            <a:ext cx="1800460" cy="1424323"/>
+          </a:xfrm>
+          <a:prstGeom prst="roundRect">
+            <a:avLst/>
+          </a:prstGeom>
+          <a:solidFill>
+            <a:srgbClr val="0070C0"/>
+          </a:solidFill>
+        </p:spPr>
+        <p:style>
+          <a:lnRef idx="2">
+            <a:schemeClr val="accent1">
+              <a:shade val="50000"/>
+            </a:schemeClr>
+          </a:lnRef>
+          <a:fillRef idx="1">
+            <a:schemeClr val="accent1"/>
+          </a:fillRef>
+          <a:effectRef idx="0">
+            <a:schemeClr val="accent1"/>
+          </a:effectRef>
+          <a:fontRef idx="minor">
+            <a:schemeClr val="lt1"/>
+          </a:fontRef>
+        </p:style>
+        <p:txBody>
+          <a:bodyPr rtlCol="0" anchor="t"/>
+          <a:lstStyle/>
+          <a:p>
+            <a:pPr algn="ctr"/>
+            <a:r>
+              <a:rPr lang="da-DK" sz="3600" smtClean="0"/>
+              <a:t>Fight</a:t>
+            </a:r>
+          </a:p>
+          <a:p>
+            <a:pPr algn="ctr"/>
+            <a:r>
+              <a:rPr lang="da-DK" sz="3600" smtClean="0"/>
+              <a:t>Club</a:t>
+            </a:r>
+          </a:p>
+        </p:txBody>
+      </p:sp>
+      <p:sp>
+        <p:nvSpPr>
+          <p:cNvPr id="5" name="Afrundet rektangel 4"/>
+          <p:cNvSpPr/>
+          <p:nvPr/>
+        </p:nvSpPr>
+        <p:spPr>
+          <a:xfrm>
+            <a:off x="4317055" y="1397081"/>
+            <a:ext cx="1800460" cy="1424323"/>
+          </a:xfrm>
+          <a:prstGeom prst="roundRect">
+            <a:avLst/>
+          </a:prstGeom>
+          <a:solidFill>
+            <a:srgbClr val="0070C0">
+              <a:alpha val="40000"/>
+            </a:srgbClr>
+          </a:solidFill>
+        </p:spPr>
+        <p:style>
+          <a:lnRef idx="2">
+            <a:schemeClr val="accent1">
+              <a:shade val="50000"/>
+            </a:schemeClr>
+          </a:lnRef>
+          <a:fillRef idx="1">
+            <a:schemeClr val="accent1"/>
+          </a:fillRef>
+          <a:effectRef idx="0">
+            <a:schemeClr val="accent1"/>
+          </a:effectRef>
+          <a:fontRef idx="minor">
+            <a:schemeClr val="lt1"/>
+          </a:fontRef>
+        </p:style>
+        <p:txBody>
+          <a:bodyPr rtlCol="0" anchor="t"/>
+          <a:lstStyle/>
+          <a:p>
+            <a:pPr algn="ctr"/>
+            <a:r>
+              <a:rPr lang="da-DK" sz="3600" smtClean="0">
+                <a:solidFill>
+                  <a:srgbClr val="FFFF00"/>
+                </a:solidFill>
+              </a:rPr>
+              <a:t>IFight</a:t>
+            </a:r>
+          </a:p>
+          <a:p>
+            <a:pPr algn="ctr"/>
+            <a:r>
+              <a:rPr lang="da-DK" sz="3600" smtClean="0">
+                <a:solidFill>
+                  <a:srgbClr val="FFFF00"/>
+                </a:solidFill>
+              </a:rPr>
+              <a:t>Club</a:t>
+            </a:r>
+          </a:p>
+        </p:txBody>
+      </p:sp>
+      <p:cxnSp>
+        <p:nvCxnSpPr>
+          <p:cNvPr id="7" name="Vinklet forbindelse 2"/>
+          <p:cNvCxnSpPr>
+            <a:stCxn id="6" idx="0"/>
+            <a:endCxn id="5" idx="2"/>
+          </p:cNvCxnSpPr>
+          <p:nvPr/>
+        </p:nvCxnSpPr>
+        <p:spPr>
+          <a:xfrm flipV="1">
+            <a:off x="5217285" y="2821404"/>
+            <a:ext cx="0" cy="771441"/>
+          </a:xfrm>
+          <a:prstGeom prst="straightConnector1">
+            <a:avLst/>
+          </a:prstGeom>
+          <a:ln w="76200">
+            <a:solidFill>
+              <a:schemeClr val="tx1"/>
+            </a:solidFill>
+            <a:headEnd w="lg" len="lg"/>
+            <a:tailEnd type="triangle" w="lg" len="lg"/>
+          </a:ln>
+        </p:spPr>
+        <p:style>
+          <a:lnRef idx="1">
+            <a:schemeClr val="accent1"/>
+          </a:lnRef>
+          <a:fillRef idx="0">
+            <a:schemeClr val="accent1"/>
+          </a:fillRef>
+          <a:effectRef idx="0">
+            <a:schemeClr val="accent1"/>
+          </a:effectRef>
+          <a:fontRef idx="minor">
+            <a:schemeClr val="tx1"/>
+          </a:fontRef>
+        </p:style>
+      </p:cxnSp>
+      <p:sp>
+        <p:nvSpPr>
+          <p:cNvPr id="8" name="Afrundet rektangel 7"/>
+          <p:cNvSpPr/>
+          <p:nvPr/>
+        </p:nvSpPr>
+        <p:spPr>
+          <a:xfrm>
+            <a:off x="534491" y="1397081"/>
+            <a:ext cx="2400614" cy="1424323"/>
+          </a:xfrm>
+          <a:prstGeom prst="roundRect">
+            <a:avLst/>
+          </a:prstGeom>
+          <a:solidFill>
+            <a:schemeClr val="accent6">
+              <a:lumMod val="75000"/>
+            </a:schemeClr>
+          </a:solidFill>
+        </p:spPr>
+        <p:style>
+          <a:lnRef idx="2">
+            <a:schemeClr val="accent1">
+              <a:shade val="50000"/>
+            </a:schemeClr>
+          </a:lnRef>
+          <a:fillRef idx="1">
+            <a:schemeClr val="accent1"/>
+          </a:fillRef>
+          <a:effectRef idx="0">
+            <a:schemeClr val="accent1"/>
+          </a:effectRef>
+          <a:fontRef idx="minor">
+            <a:schemeClr val="lt1"/>
+          </a:fontRef>
+        </p:style>
+        <p:txBody>
+          <a:bodyPr rtlCol="0" anchor="t"/>
+          <a:lstStyle/>
+          <a:p>
+            <a:pPr algn="ctr"/>
+            <a:r>
+              <a:rPr lang="da-DK" sz="3600" smtClean="0"/>
+              <a:t>Client</a:t>
+            </a:r>
+          </a:p>
+        </p:txBody>
+      </p:sp>
+      <p:cxnSp>
+        <p:nvCxnSpPr>
+          <p:cNvPr id="9" name="Vinklet forbindelse 2"/>
+          <p:cNvCxnSpPr>
+            <a:stCxn id="8" idx="3"/>
+            <a:endCxn id="5" idx="1"/>
+          </p:cNvCxnSpPr>
+          <p:nvPr/>
+        </p:nvCxnSpPr>
+        <p:spPr>
+          <a:xfrm>
+            <a:off x="2935105" y="2109243"/>
+            <a:ext cx="1381950" cy="0"/>
+          </a:xfrm>
+          <a:prstGeom prst="straightConnector1">
+            <a:avLst/>
+          </a:prstGeom>
+          <a:ln w="76200">
+            <a:solidFill>
+              <a:schemeClr val="tx1"/>
+            </a:solidFill>
+            <a:headEnd w="lg" len="lg"/>
+            <a:tailEnd type="arrow" w="lg" len="lg"/>
+          </a:ln>
+        </p:spPr>
+        <p:style>
+          <a:lnRef idx="1">
+            <a:schemeClr val="accent1"/>
+          </a:lnRef>
+          <a:fillRef idx="0">
+            <a:schemeClr val="accent1"/>
+          </a:fillRef>
+          <a:effectRef idx="0">
+            <a:schemeClr val="accent1"/>
+          </a:effectRef>
+          <a:fontRef idx="minor">
+            <a:schemeClr val="tx1"/>
+          </a:fontRef>
+        </p:style>
+      </p:cxnSp>
+      <p:cxnSp>
+        <p:nvCxnSpPr>
+          <p:cNvPr id="17" name="Vinklet forbindelse 2"/>
+          <p:cNvCxnSpPr>
+            <a:stCxn id="8" idx="2"/>
+            <a:endCxn id="11" idx="0"/>
+          </p:cNvCxnSpPr>
+          <p:nvPr/>
+        </p:nvCxnSpPr>
+        <p:spPr>
+          <a:xfrm>
+            <a:off x="1734798" y="2821404"/>
+            <a:ext cx="0" cy="1024553"/>
+          </a:xfrm>
+          <a:prstGeom prst="straightConnector1">
+            <a:avLst/>
+          </a:prstGeom>
+          <a:ln w="76200">
+            <a:solidFill>
+              <a:schemeClr val="tx1"/>
+            </a:solidFill>
+            <a:headEnd w="lg" len="lg"/>
+            <a:tailEnd type="arrow" w="lg" len="lg"/>
+          </a:ln>
+        </p:spPr>
+        <p:style>
+          <a:lnRef idx="1">
+            <a:schemeClr val="accent1"/>
+          </a:lnRef>
+          <a:fillRef idx="0">
+            <a:schemeClr val="accent1"/>
+          </a:fillRef>
+          <a:effectRef idx="0">
+            <a:schemeClr val="accent1"/>
+          </a:effectRef>
+          <a:fontRef idx="minor">
+            <a:schemeClr val="tx1"/>
+          </a:fontRef>
+        </p:style>
+      </p:cxnSp>
+      <p:sp>
+        <p:nvSpPr>
+          <p:cNvPr id="10" name="Afrundet rektangel 9"/>
+          <p:cNvSpPr/>
+          <p:nvPr/>
+        </p:nvSpPr>
+        <p:spPr>
+          <a:xfrm>
+            <a:off x="7363050" y="3592844"/>
+            <a:ext cx="1800460" cy="1424323"/>
+          </a:xfrm>
+          <a:prstGeom prst="roundRect">
+            <a:avLst/>
+          </a:prstGeom>
+          <a:solidFill>
+            <a:srgbClr val="C00000"/>
+          </a:solidFill>
+        </p:spPr>
+        <p:style>
+          <a:lnRef idx="2">
+            <a:schemeClr val="accent1">
+              <a:shade val="50000"/>
+            </a:schemeClr>
+          </a:lnRef>
+          <a:fillRef idx="1">
+            <a:schemeClr val="accent1"/>
+          </a:fillRef>
+          <a:effectRef idx="0">
+            <a:schemeClr val="accent1"/>
+          </a:effectRef>
+          <a:fontRef idx="minor">
+            <a:schemeClr val="lt1"/>
+          </a:fontRef>
+        </p:style>
+        <p:txBody>
+          <a:bodyPr rtlCol="0" anchor="t"/>
+          <a:lstStyle/>
+          <a:p>
+            <a:pPr algn="ctr"/>
+            <a:r>
+              <a:rPr lang="da-DK" sz="2800" smtClean="0"/>
+              <a:t>Fight</a:t>
+            </a:r>
+          </a:p>
+          <a:p>
+            <a:pPr algn="ctr"/>
+            <a:r>
+              <a:rPr lang="da-DK" sz="2800" smtClean="0"/>
+              <a:t>Club</a:t>
+            </a:r>
+          </a:p>
+          <a:p>
+            <a:pPr algn="ctr"/>
+            <a:r>
+              <a:rPr lang="da-DK" sz="2800" smtClean="0"/>
+              <a:t>Fair</a:t>
+            </a:r>
+          </a:p>
+        </p:txBody>
+      </p:sp>
+      <p:cxnSp>
+        <p:nvCxnSpPr>
+          <p:cNvPr id="12" name="Vinklet forbindelse 2"/>
+          <p:cNvCxnSpPr>
+            <a:stCxn id="10" idx="1"/>
+            <a:endCxn id="6" idx="3"/>
+          </p:cNvCxnSpPr>
+          <p:nvPr/>
+        </p:nvCxnSpPr>
+        <p:spPr>
+          <a:xfrm flipH="1">
+            <a:off x="6117515" y="4305006"/>
+            <a:ext cx="1245535" cy="1"/>
+          </a:xfrm>
+          <a:prstGeom prst="straightConnector1">
+            <a:avLst/>
+          </a:prstGeom>
+          <a:ln w="76200">
+            <a:solidFill>
+              <a:schemeClr val="tx1"/>
+            </a:solidFill>
+            <a:headEnd w="lg" len="lg"/>
+            <a:tailEnd type="triangle" w="lg" len="lg"/>
+          </a:ln>
+        </p:spPr>
+        <p:style>
+          <a:lnRef idx="1">
+            <a:schemeClr val="accent1"/>
+          </a:lnRef>
+          <a:fillRef idx="0">
+            <a:schemeClr val="accent1"/>
+          </a:fillRef>
+          <a:effectRef idx="0">
+            <a:schemeClr val="accent1"/>
+          </a:effectRef>
+          <a:fontRef idx="minor">
+            <a:schemeClr val="tx1"/>
+          </a:fontRef>
+        </p:style>
+      </p:cxnSp>
+    </p:spTree>
+    <p:extLst>
+      <p:ext uri="{BB962C8B-B14F-4D97-AF65-F5344CB8AC3E}">
+        <p14:creationId xmlns:p14="http://schemas.microsoft.com/office/powerpoint/2010/main" val="3023109070"/>
+      </p:ext>
+    </p:extLst>
+  </p:cSld>
+  <p:clrMapOvr>
+    <a:masterClrMapping/>
+  </p:clrMapOvr>
+  <mc:AlternateContent xmlns:mc="http://schemas.openxmlformats.org/markup-compatibility/2006">
+    <mc:Choice xmlns:p14="http://schemas.microsoft.com/office/powerpoint/2010/main" Requires="p14">
+      <p:transition spd="med" p14:dur="700">
+        <p:fade/>
+      </p:transition>
+    </mc:Choice>
+    <mc:Fallback>
+      <p:transition spd="med">
+        <p:fade/>
+      </p:transition>
+    </mc:Fallback>
+  </mc:AlternateContent>
+  <p:timing>
+    <p:tnLst>
+      <p:par>
+        <p:cTn id="1" dur="indefinite" restart="never" nodeType="tmRoot"/>
+      </p:par>
+    </p:tnLst>
+  </p:timing>
+</p:sld>
+</file>
+
+<file path=ppt/slides/slide24.xml><?xml version="1.0" encoding="utf-8"?>
+<p:sld xmlns:a="http://schemas.openxmlformats.org/drawingml/2006/main" xmlns:r="http://schemas.openxmlformats.org/officeDocument/2006/relationships" xmlns:p="http://schemas.openxmlformats.org/presentationml/2006/main">
+  <p:cSld>
+    <p:spTree>
+      <p:nvGrpSpPr>
+        <p:cNvPr id="1" name=""/>
+        <p:cNvGrpSpPr/>
+        <p:nvPr/>
+      </p:nvGrpSpPr>
+      <p:grpSpPr>
+        <a:xfrm>
+          <a:off x="0" y="0"/>
+          <a:ext cx="0" cy="0"/>
+          <a:chOff x="0" y="0"/>
+          <a:chExt cx="0" cy="0"/>
+        </a:xfrm>
+      </p:grpSpPr>
+      <p:cxnSp>
+        <p:nvCxnSpPr>
+          <p:cNvPr id="16" name="Vinklet forbindelse 2"/>
+          <p:cNvCxnSpPr>
+            <a:stCxn id="6" idx="1"/>
+            <a:endCxn id="11" idx="3"/>
+          </p:cNvCxnSpPr>
+          <p:nvPr/>
+        </p:nvCxnSpPr>
+        <p:spPr>
+          <a:xfrm flipH="1" flipV="1">
+            <a:off x="2635028" y="4305006"/>
+            <a:ext cx="1682027" cy="1"/>
+          </a:xfrm>
+          <a:prstGeom prst="straightConnector1">
+            <a:avLst/>
+          </a:prstGeom>
+          <a:ln w="76200">
+            <a:solidFill>
+              <a:schemeClr val="tx1"/>
+            </a:solidFill>
+            <a:headEnd w="lg" len="lg"/>
+            <a:tailEnd type="arrow" w="lg" len="lg"/>
+          </a:ln>
+        </p:spPr>
+        <p:style>
+          <a:lnRef idx="1">
+            <a:schemeClr val="accent1"/>
+          </a:lnRef>
+          <a:fillRef idx="0">
+            <a:schemeClr val="accent1"/>
+          </a:fillRef>
+          <a:effectRef idx="0">
+            <a:schemeClr val="accent1"/>
+          </a:effectRef>
+          <a:fontRef idx="minor">
+            <a:schemeClr val="tx1"/>
+          </a:fontRef>
+        </p:style>
+      </p:cxnSp>
+      <p:sp>
+        <p:nvSpPr>
+          <p:cNvPr id="11" name="Afrundet rektangel 10"/>
+          <p:cNvSpPr/>
+          <p:nvPr/>
+        </p:nvSpPr>
+        <p:spPr>
+          <a:xfrm>
+            <a:off x="834568" y="3845957"/>
+            <a:ext cx="1800460" cy="918098"/>
+          </a:xfrm>
+          <a:prstGeom prst="roundRect">
+            <a:avLst/>
+          </a:prstGeom>
+          <a:solidFill>
+            <a:srgbClr val="C00000"/>
+          </a:solidFill>
+        </p:spPr>
+        <p:style>
+          <a:lnRef idx="2">
+            <a:schemeClr val="accent1">
+              <a:shade val="50000"/>
+            </a:schemeClr>
+          </a:lnRef>
+          <a:fillRef idx="1">
+            <a:schemeClr val="accent1"/>
+          </a:fillRef>
+          <a:effectRef idx="0">
+            <a:schemeClr val="accent1"/>
+          </a:effectRef>
+          <a:fontRef idx="minor">
+            <a:schemeClr val="lt1"/>
+          </a:fontRef>
+        </p:style>
+        <p:txBody>
+          <a:bodyPr rtlCol="0" anchor="t"/>
+          <a:lstStyle/>
+          <a:p>
+            <a:pPr algn="ctr"/>
+            <a:r>
+              <a:rPr lang="da-DK" sz="3600" smtClean="0"/>
+              <a:t>Fighter</a:t>
+            </a:r>
+          </a:p>
+        </p:txBody>
+      </p:sp>
+      <p:sp>
+        <p:nvSpPr>
+          <p:cNvPr id="6" name="Afrundet rektangel 5"/>
+          <p:cNvSpPr/>
+          <p:nvPr/>
+        </p:nvSpPr>
+        <p:spPr>
+          <a:xfrm>
+            <a:off x="4317055" y="3592845"/>
+            <a:ext cx="1800460" cy="1424323"/>
+          </a:xfrm>
+          <a:prstGeom prst="roundRect">
+            <a:avLst/>
+          </a:prstGeom>
+          <a:solidFill>
+            <a:srgbClr val="0070C0"/>
+          </a:solidFill>
+        </p:spPr>
+        <p:style>
+          <a:lnRef idx="2">
+            <a:schemeClr val="accent1">
+              <a:shade val="50000"/>
+            </a:schemeClr>
+          </a:lnRef>
+          <a:fillRef idx="1">
+            <a:schemeClr val="accent1"/>
+          </a:fillRef>
+          <a:effectRef idx="0">
+            <a:schemeClr val="accent1"/>
+          </a:effectRef>
+          <a:fontRef idx="minor">
+            <a:schemeClr val="lt1"/>
+          </a:fontRef>
+        </p:style>
+        <p:txBody>
+          <a:bodyPr rtlCol="0" anchor="t"/>
+          <a:lstStyle/>
+          <a:p>
+            <a:pPr algn="ctr"/>
+            <a:r>
+              <a:rPr lang="da-DK" sz="3600" smtClean="0"/>
+              <a:t>Fight</a:t>
+            </a:r>
+          </a:p>
+          <a:p>
+            <a:pPr algn="ctr"/>
+            <a:r>
+              <a:rPr lang="da-DK" sz="3600" smtClean="0"/>
+              <a:t>Club</a:t>
+            </a:r>
+          </a:p>
+        </p:txBody>
+      </p:sp>
+      <p:sp>
+        <p:nvSpPr>
+          <p:cNvPr id="5" name="Afrundet rektangel 4"/>
+          <p:cNvSpPr/>
+          <p:nvPr/>
+        </p:nvSpPr>
+        <p:spPr>
+          <a:xfrm>
+            <a:off x="4317055" y="1397081"/>
+            <a:ext cx="1800460" cy="1424323"/>
+          </a:xfrm>
+          <a:prstGeom prst="roundRect">
+            <a:avLst/>
+          </a:prstGeom>
+          <a:solidFill>
+            <a:srgbClr val="0070C0">
+              <a:alpha val="40000"/>
+            </a:srgbClr>
+          </a:solidFill>
+        </p:spPr>
+        <p:style>
+          <a:lnRef idx="2">
+            <a:schemeClr val="accent1">
+              <a:shade val="50000"/>
+            </a:schemeClr>
+          </a:lnRef>
+          <a:fillRef idx="1">
+            <a:schemeClr val="accent1"/>
+          </a:fillRef>
+          <a:effectRef idx="0">
+            <a:schemeClr val="accent1"/>
+          </a:effectRef>
+          <a:fontRef idx="minor">
+            <a:schemeClr val="lt1"/>
+          </a:fontRef>
+        </p:style>
+        <p:txBody>
+          <a:bodyPr rtlCol="0" anchor="t"/>
+          <a:lstStyle/>
+          <a:p>
+            <a:pPr algn="ctr"/>
+            <a:r>
+              <a:rPr lang="da-DK" sz="3600" smtClean="0">
+                <a:solidFill>
+                  <a:srgbClr val="FFFF00"/>
+                </a:solidFill>
+              </a:rPr>
+              <a:t>IFight</a:t>
+            </a:r>
+          </a:p>
+          <a:p>
+            <a:pPr algn="ctr"/>
+            <a:r>
+              <a:rPr lang="da-DK" sz="3600" smtClean="0">
+                <a:solidFill>
+                  <a:srgbClr val="FFFF00"/>
+                </a:solidFill>
+              </a:rPr>
+              <a:t>Club</a:t>
+            </a:r>
+          </a:p>
+        </p:txBody>
+      </p:sp>
+      <p:cxnSp>
+        <p:nvCxnSpPr>
+          <p:cNvPr id="7" name="Vinklet forbindelse 2"/>
+          <p:cNvCxnSpPr>
+            <a:stCxn id="6" idx="0"/>
+            <a:endCxn id="5" idx="2"/>
+          </p:cNvCxnSpPr>
+          <p:nvPr/>
+        </p:nvCxnSpPr>
+        <p:spPr>
+          <a:xfrm flipV="1">
+            <a:off x="5217285" y="2821404"/>
+            <a:ext cx="0" cy="771441"/>
+          </a:xfrm>
+          <a:prstGeom prst="straightConnector1">
+            <a:avLst/>
+          </a:prstGeom>
+          <a:ln w="76200">
+            <a:solidFill>
+              <a:schemeClr val="tx1"/>
+            </a:solidFill>
+            <a:headEnd w="lg" len="lg"/>
+            <a:tailEnd type="triangle" w="lg" len="lg"/>
+          </a:ln>
+        </p:spPr>
+        <p:style>
+          <a:lnRef idx="1">
+            <a:schemeClr val="accent1"/>
+          </a:lnRef>
+          <a:fillRef idx="0">
+            <a:schemeClr val="accent1"/>
+          </a:fillRef>
+          <a:effectRef idx="0">
+            <a:schemeClr val="accent1"/>
+          </a:effectRef>
+          <a:fontRef idx="minor">
+            <a:schemeClr val="tx1"/>
+          </a:fontRef>
+        </p:style>
+      </p:cxnSp>
+      <p:sp>
+        <p:nvSpPr>
+          <p:cNvPr id="8" name="Afrundet rektangel 7"/>
+          <p:cNvSpPr/>
+          <p:nvPr/>
+        </p:nvSpPr>
+        <p:spPr>
+          <a:xfrm>
+            <a:off x="534491" y="1397081"/>
+            <a:ext cx="2400614" cy="1424323"/>
+          </a:xfrm>
+          <a:prstGeom prst="roundRect">
+            <a:avLst/>
+          </a:prstGeom>
+          <a:solidFill>
+            <a:schemeClr val="accent6">
+              <a:lumMod val="75000"/>
+            </a:schemeClr>
+          </a:solidFill>
+        </p:spPr>
+        <p:style>
+          <a:lnRef idx="2">
+            <a:schemeClr val="accent1">
+              <a:shade val="50000"/>
+            </a:schemeClr>
+          </a:lnRef>
+          <a:fillRef idx="1">
+            <a:schemeClr val="accent1"/>
+          </a:fillRef>
+          <a:effectRef idx="0">
+            <a:schemeClr val="accent1"/>
+          </a:effectRef>
+          <a:fontRef idx="minor">
+            <a:schemeClr val="lt1"/>
+          </a:fontRef>
+        </p:style>
+        <p:txBody>
+          <a:bodyPr rtlCol="0" anchor="t"/>
+          <a:lstStyle/>
+          <a:p>
+            <a:pPr algn="ctr"/>
+            <a:r>
+              <a:rPr lang="da-DK" sz="3600" smtClean="0"/>
+              <a:t>Client</a:t>
+            </a:r>
+          </a:p>
+        </p:txBody>
+      </p:sp>
+      <p:cxnSp>
+        <p:nvCxnSpPr>
+          <p:cNvPr id="9" name="Vinklet forbindelse 2"/>
+          <p:cNvCxnSpPr>
+            <a:stCxn id="8" idx="3"/>
+            <a:endCxn id="5" idx="1"/>
+          </p:cNvCxnSpPr>
+          <p:nvPr/>
+        </p:nvCxnSpPr>
+        <p:spPr>
+          <a:xfrm>
+            <a:off x="2935105" y="2109243"/>
+            <a:ext cx="1381950" cy="0"/>
+          </a:xfrm>
+          <a:prstGeom prst="straightConnector1">
+            <a:avLst/>
+          </a:prstGeom>
+          <a:ln w="76200">
+            <a:solidFill>
+              <a:schemeClr val="tx1"/>
+            </a:solidFill>
+            <a:headEnd w="lg" len="lg"/>
+            <a:tailEnd type="arrow" w="lg" len="lg"/>
+          </a:ln>
+        </p:spPr>
+        <p:style>
+          <a:lnRef idx="1">
+            <a:schemeClr val="accent1"/>
+          </a:lnRef>
+          <a:fillRef idx="0">
+            <a:schemeClr val="accent1"/>
+          </a:fillRef>
+          <a:effectRef idx="0">
+            <a:schemeClr val="accent1"/>
+          </a:effectRef>
+          <a:fontRef idx="minor">
+            <a:schemeClr val="tx1"/>
+          </a:fontRef>
+        </p:style>
+      </p:cxnSp>
+      <p:cxnSp>
+        <p:nvCxnSpPr>
+          <p:cNvPr id="17" name="Vinklet forbindelse 2"/>
+          <p:cNvCxnSpPr>
+            <a:stCxn id="8" idx="2"/>
+            <a:endCxn id="11" idx="0"/>
+          </p:cNvCxnSpPr>
+          <p:nvPr/>
+        </p:nvCxnSpPr>
+        <p:spPr>
+          <a:xfrm>
+            <a:off x="1734798" y="2821404"/>
+            <a:ext cx="0" cy="1024553"/>
+          </a:xfrm>
+          <a:prstGeom prst="straightConnector1">
+            <a:avLst/>
+          </a:prstGeom>
+          <a:ln w="76200">
+            <a:solidFill>
+              <a:schemeClr val="tx1"/>
+            </a:solidFill>
+            <a:headEnd w="lg" len="lg"/>
+            <a:tailEnd type="arrow" w="lg" len="lg"/>
+          </a:ln>
+        </p:spPr>
+        <p:style>
+          <a:lnRef idx="1">
+            <a:schemeClr val="accent1"/>
+          </a:lnRef>
+          <a:fillRef idx="0">
+            <a:schemeClr val="accent1"/>
+          </a:fillRef>
+          <a:effectRef idx="0">
+            <a:schemeClr val="accent1"/>
+          </a:effectRef>
+          <a:fontRef idx="minor">
+            <a:schemeClr val="tx1"/>
+          </a:fontRef>
+        </p:style>
+      </p:cxnSp>
+      <p:sp>
+        <p:nvSpPr>
+          <p:cNvPr id="10" name="Afrundet rektangel 9"/>
+          <p:cNvSpPr/>
+          <p:nvPr/>
+        </p:nvSpPr>
+        <p:spPr>
+          <a:xfrm>
+            <a:off x="7363050" y="3592844"/>
+            <a:ext cx="1800460" cy="1424323"/>
+          </a:xfrm>
+          <a:prstGeom prst="roundRect">
+            <a:avLst/>
+          </a:prstGeom>
+          <a:solidFill>
+            <a:srgbClr val="C00000"/>
+          </a:solidFill>
+        </p:spPr>
+        <p:style>
+          <a:lnRef idx="2">
+            <a:schemeClr val="accent1">
+              <a:shade val="50000"/>
+            </a:schemeClr>
+          </a:lnRef>
+          <a:fillRef idx="1">
+            <a:schemeClr val="accent1"/>
+          </a:fillRef>
+          <a:effectRef idx="0">
+            <a:schemeClr val="accent1"/>
+          </a:effectRef>
+          <a:fontRef idx="minor">
+            <a:schemeClr val="lt1"/>
+          </a:fontRef>
+        </p:style>
+        <p:txBody>
+          <a:bodyPr rtlCol="0" anchor="t"/>
+          <a:lstStyle/>
+          <a:p>
+            <a:pPr algn="ctr"/>
+            <a:r>
+              <a:rPr lang="da-DK" sz="2800" smtClean="0"/>
+              <a:t>Fight</a:t>
+            </a:r>
+          </a:p>
+          <a:p>
+            <a:pPr algn="ctr"/>
+            <a:r>
+              <a:rPr lang="da-DK" sz="2800" smtClean="0"/>
+              <a:t>Club</a:t>
+            </a:r>
+          </a:p>
+          <a:p>
+            <a:pPr algn="ctr"/>
+            <a:r>
+              <a:rPr lang="da-DK" sz="2800" smtClean="0"/>
+              <a:t>Fair</a:t>
+            </a:r>
+          </a:p>
+        </p:txBody>
+      </p:sp>
+      <p:cxnSp>
+        <p:nvCxnSpPr>
+          <p:cNvPr id="12" name="Vinklet forbindelse 2"/>
+          <p:cNvCxnSpPr>
+            <a:stCxn id="10" idx="1"/>
+            <a:endCxn id="6" idx="3"/>
+          </p:cNvCxnSpPr>
+          <p:nvPr/>
+        </p:nvCxnSpPr>
+        <p:spPr>
+          <a:xfrm flipH="1">
+            <a:off x="6117515" y="4305006"/>
+            <a:ext cx="1245535" cy="1"/>
+          </a:xfrm>
+          <a:prstGeom prst="straightConnector1">
+            <a:avLst/>
+          </a:prstGeom>
+          <a:ln w="76200">
+            <a:solidFill>
+              <a:schemeClr val="tx1"/>
+            </a:solidFill>
+            <a:headEnd w="lg" len="lg"/>
+            <a:tailEnd type="triangle" w="lg" len="lg"/>
+          </a:ln>
+        </p:spPr>
+        <p:style>
+          <a:lnRef idx="1">
+            <a:schemeClr val="accent1"/>
+          </a:lnRef>
+          <a:fillRef idx="0">
+            <a:schemeClr val="accent1"/>
+          </a:fillRef>
+          <a:effectRef idx="0">
+            <a:schemeClr val="accent1"/>
+          </a:effectRef>
+          <a:fontRef idx="minor">
+            <a:schemeClr val="tx1"/>
+          </a:fontRef>
+        </p:style>
+      </p:cxnSp>
+      <p:cxnSp>
+        <p:nvCxnSpPr>
+          <p:cNvPr id="14" name="Vinklet forbindelse 2"/>
+          <p:cNvCxnSpPr/>
+          <p:nvPr/>
+        </p:nvCxnSpPr>
+        <p:spPr>
+          <a:xfrm flipH="1">
+            <a:off x="6045868" y="2975369"/>
+            <a:ext cx="1395664" cy="712310"/>
+          </a:xfrm>
+          <a:prstGeom prst="straightConnector1">
+            <a:avLst/>
+          </a:prstGeom>
+          <a:ln w="76200">
+            <a:solidFill>
+              <a:schemeClr val="tx1"/>
+            </a:solidFill>
+            <a:headEnd w="lg" len="lg"/>
+            <a:tailEnd type="triangle" w="lg" len="lg"/>
+          </a:ln>
+        </p:spPr>
+        <p:style>
+          <a:lnRef idx="1">
+            <a:schemeClr val="accent1"/>
+          </a:lnRef>
+          <a:fillRef idx="0">
+            <a:schemeClr val="accent1"/>
+          </a:fillRef>
+          <a:effectRef idx="0">
+            <a:schemeClr val="accent1"/>
+          </a:effectRef>
+          <a:fontRef idx="minor">
+            <a:schemeClr val="tx1"/>
+          </a:fontRef>
+        </p:style>
+      </p:cxnSp>
+      <p:sp>
+        <p:nvSpPr>
+          <p:cNvPr id="13" name="Afrundet rektangel 12"/>
+          <p:cNvSpPr/>
+          <p:nvPr/>
+        </p:nvSpPr>
+        <p:spPr>
+          <a:xfrm>
+            <a:off x="7363050" y="1645733"/>
+            <a:ext cx="1800460" cy="1424323"/>
+          </a:xfrm>
+          <a:prstGeom prst="roundRect">
+            <a:avLst/>
+          </a:prstGeom>
+          <a:solidFill>
+            <a:srgbClr val="C00000"/>
+          </a:solidFill>
+        </p:spPr>
+        <p:style>
+          <a:lnRef idx="2">
+            <a:schemeClr val="accent1">
+              <a:shade val="50000"/>
+            </a:schemeClr>
+          </a:lnRef>
+          <a:fillRef idx="1">
+            <a:schemeClr val="accent1"/>
+          </a:fillRef>
+          <a:effectRef idx="0">
+            <a:schemeClr val="accent1"/>
+          </a:effectRef>
+          <a:fontRef idx="minor">
+            <a:schemeClr val="lt1"/>
+          </a:fontRef>
+        </p:style>
+        <p:txBody>
+          <a:bodyPr rtlCol="0" anchor="t"/>
+          <a:lstStyle/>
+          <a:p>
+            <a:pPr algn="ctr"/>
+            <a:r>
+              <a:rPr lang="da-DK" sz="2800" smtClean="0"/>
+              <a:t>Fight</a:t>
+            </a:r>
+          </a:p>
+          <a:p>
+            <a:pPr algn="ctr"/>
+            <a:r>
+              <a:rPr lang="da-DK" sz="2800" smtClean="0"/>
+              <a:t>Club</a:t>
+            </a:r>
+          </a:p>
+          <a:p>
+            <a:pPr algn="ctr"/>
+            <a:r>
+              <a:rPr lang="da-DK" sz="2800" smtClean="0"/>
+              <a:t>BiasedA</a:t>
+            </a:r>
+          </a:p>
+        </p:txBody>
+      </p:sp>
+    </p:spTree>
+    <p:extLst>
+      <p:ext uri="{BB962C8B-B14F-4D97-AF65-F5344CB8AC3E}">
+        <p14:creationId xmlns:p14="http://schemas.microsoft.com/office/powerpoint/2010/main" val="1857849147"/>
+      </p:ext>
+    </p:extLst>
+  </p:cSld>
+  <p:clrMapOvr>
+    <a:masterClrMapping/>
+  </p:clrMapOvr>
+  <mc:AlternateContent xmlns:mc="http://schemas.openxmlformats.org/markup-compatibility/2006">
+    <mc:Choice xmlns:p14="http://schemas.microsoft.com/office/powerpoint/2010/main" Requires="p14">
+      <p:transition spd="med" p14:dur="700">
+        <p:fade/>
+      </p:transition>
+    </mc:Choice>
+    <mc:Fallback>
+      <p:transition spd="med">
+        <p:fade/>
+      </p:transition>
+    </mc:Fallback>
+  </mc:AlternateContent>
+  <p:timing>
+    <p:tnLst>
+      <p:par>
+        <p:cTn id="1" dur="indefinite" restart="never" nodeType="tmRoot"/>
+      </p:par>
+    </p:tnLst>
+  </p:timing>
+</p:sld>
+</file>
+
+<file path=ppt/slides/slide25.xml><?xml version="1.0" encoding="utf-8"?>
+<p:sld xmlns:a="http://schemas.openxmlformats.org/drawingml/2006/main" xmlns:r="http://schemas.openxmlformats.org/officeDocument/2006/relationships" xmlns:p="http://schemas.openxmlformats.org/presentationml/2006/main">
+  <p:cSld>
+    <p:spTree>
+      <p:nvGrpSpPr>
+        <p:cNvPr id="1" name=""/>
+        <p:cNvGrpSpPr/>
+        <p:nvPr/>
+      </p:nvGrpSpPr>
+      <p:grpSpPr>
+        <a:xfrm>
+          <a:off x="0" y="0"/>
+          <a:ext cx="0" cy="0"/>
+          <a:chOff x="0" y="0"/>
+          <a:chExt cx="0" cy="0"/>
+        </a:xfrm>
+      </p:grpSpPr>
       <p:sp>
         <p:nvSpPr>
           <p:cNvPr id="3" name="Tekstfelt 2"/>
@@ -7940,13 +8680,7 @@
               <a:rPr lang="da-DK" b="1" smtClean="0">
                 <a:latin typeface="Consolas" panose="020B0609020204030204" pitchFamily="49" charset="0"/>
               </a:rPr>
-              <a:t>   </a:t>
-            </a:r>
-            <a:r>
-              <a:rPr lang="da-DK" b="1" smtClean="0">
-                <a:latin typeface="Consolas" panose="020B0609020204030204" pitchFamily="49" charset="0"/>
-              </a:rPr>
-              <a:t>{</a:t>
+              <a:t>   {</a:t>
             </a:r>
           </a:p>
           <a:p>
@@ -8206,7 +8940,481 @@
 </p:sld>
 </file>
 
-<file path=ppt/slides/slide24.xml><?xml version="1.0" encoding="utf-8"?>
+<file path=ppt/slides/slide26.xml><?xml version="1.0" encoding="utf-8"?>
+<p:sld xmlns:a="http://schemas.openxmlformats.org/drawingml/2006/main" xmlns:r="http://schemas.openxmlformats.org/officeDocument/2006/relationships" xmlns:p="http://schemas.openxmlformats.org/presentationml/2006/main">
+  <p:cSld>
+    <p:spTree>
+      <p:nvGrpSpPr>
+        <p:cNvPr id="1" name=""/>
+        <p:cNvGrpSpPr/>
+        <p:nvPr/>
+      </p:nvGrpSpPr>
+      <p:grpSpPr>
+        <a:xfrm>
+          <a:off x="0" y="0"/>
+          <a:ext cx="0" cy="0"/>
+          <a:chOff x="0" y="0"/>
+          <a:chExt cx="0" cy="0"/>
+        </a:xfrm>
+      </p:grpSpPr>
+      <p:sp>
+        <p:nvSpPr>
+          <p:cNvPr id="14" name="Afrundet rektangel 13"/>
+          <p:cNvSpPr/>
+          <p:nvPr/>
+        </p:nvSpPr>
+        <p:spPr>
+          <a:xfrm>
+            <a:off x="6081587" y="3574377"/>
+            <a:ext cx="1800460" cy="1424323"/>
+          </a:xfrm>
+          <a:prstGeom prst="roundRect">
+            <a:avLst/>
+          </a:prstGeom>
+          <a:solidFill>
+            <a:srgbClr val="C00000"/>
+          </a:solidFill>
+        </p:spPr>
+        <p:style>
+          <a:lnRef idx="2">
+            <a:schemeClr val="accent1">
+              <a:shade val="50000"/>
+            </a:schemeClr>
+          </a:lnRef>
+          <a:fillRef idx="1">
+            <a:schemeClr val="accent1"/>
+          </a:fillRef>
+          <a:effectRef idx="0">
+            <a:schemeClr val="accent1"/>
+          </a:effectRef>
+          <a:fontRef idx="minor">
+            <a:schemeClr val="lt1"/>
+          </a:fontRef>
+        </p:style>
+        <p:txBody>
+          <a:bodyPr rtlCol="0" anchor="t"/>
+          <a:lstStyle/>
+          <a:p>
+            <a:pPr algn="ctr"/>
+            <a:endParaRPr lang="da-DK" sz="2800" smtClean="0"/>
+          </a:p>
+        </p:txBody>
+      </p:sp>
+      <p:sp>
+        <p:nvSpPr>
+          <p:cNvPr id="4" name="Afrundet rektangel 3"/>
+          <p:cNvSpPr/>
+          <p:nvPr/>
+        </p:nvSpPr>
+        <p:spPr>
+          <a:xfrm>
+            <a:off x="2495819" y="3421977"/>
+            <a:ext cx="1800460" cy="1424323"/>
+          </a:xfrm>
+          <a:prstGeom prst="roundRect">
+            <a:avLst/>
+          </a:prstGeom>
+          <a:solidFill>
+            <a:schemeClr val="accent6">
+              <a:lumMod val="75000"/>
+            </a:schemeClr>
+          </a:solidFill>
+        </p:spPr>
+        <p:style>
+          <a:lnRef idx="2">
+            <a:schemeClr val="accent1">
+              <a:shade val="50000"/>
+            </a:schemeClr>
+          </a:lnRef>
+          <a:fillRef idx="1">
+            <a:schemeClr val="accent1"/>
+          </a:fillRef>
+          <a:effectRef idx="0">
+            <a:schemeClr val="accent1"/>
+          </a:effectRef>
+          <a:fontRef idx="minor">
+            <a:schemeClr val="lt1"/>
+          </a:fontRef>
+        </p:style>
+        <p:txBody>
+          <a:bodyPr rtlCol="0" anchor="t"/>
+          <a:lstStyle/>
+          <a:p>
+            <a:pPr algn="ctr"/>
+            <a:r>
+              <a:rPr lang="da-DK" sz="3600" smtClean="0"/>
+              <a:t>Client</a:t>
+            </a:r>
+            <a:endParaRPr lang="da-DK" sz="3600" smtClean="0"/>
+          </a:p>
+        </p:txBody>
+      </p:sp>
+      <p:cxnSp>
+        <p:nvCxnSpPr>
+          <p:cNvPr id="26" name="Vinklet forbindelse 2"/>
+          <p:cNvCxnSpPr>
+            <a:stCxn id="19" idx="2"/>
+            <a:endCxn id="4" idx="0"/>
+          </p:cNvCxnSpPr>
+          <p:nvPr/>
+        </p:nvCxnSpPr>
+        <p:spPr>
+          <a:xfrm flipH="1">
+            <a:off x="3396049" y="1909675"/>
+            <a:ext cx="1632908" cy="1512302"/>
+          </a:xfrm>
+          <a:prstGeom prst="straightConnector1">
+            <a:avLst/>
+          </a:prstGeom>
+          <a:ln w="76200">
+            <a:solidFill>
+              <a:schemeClr val="tx1"/>
+            </a:solidFill>
+            <a:headEnd w="lg" len="lg"/>
+            <a:tailEnd type="arrow" w="lg" len="lg"/>
+          </a:ln>
+        </p:spPr>
+        <p:style>
+          <a:lnRef idx="1">
+            <a:schemeClr val="accent1"/>
+          </a:lnRef>
+          <a:fillRef idx="0">
+            <a:schemeClr val="accent1"/>
+          </a:fillRef>
+          <a:effectRef idx="0">
+            <a:schemeClr val="accent1"/>
+          </a:effectRef>
+          <a:fontRef idx="minor">
+            <a:schemeClr val="tx1"/>
+          </a:fontRef>
+        </p:style>
+      </p:cxnSp>
+      <p:cxnSp>
+        <p:nvCxnSpPr>
+          <p:cNvPr id="27" name="Vinklet forbindelse 2"/>
+          <p:cNvCxnSpPr>
+            <a:stCxn id="19" idx="2"/>
+            <a:endCxn id="11" idx="0"/>
+          </p:cNvCxnSpPr>
+          <p:nvPr/>
+        </p:nvCxnSpPr>
+        <p:spPr>
+          <a:xfrm>
+            <a:off x="5028957" y="1909675"/>
+            <a:ext cx="1800460" cy="1512302"/>
+          </a:xfrm>
+          <a:prstGeom prst="straightConnector1">
+            <a:avLst/>
+          </a:prstGeom>
+          <a:ln w="76200">
+            <a:solidFill>
+              <a:schemeClr val="tx1"/>
+            </a:solidFill>
+            <a:headEnd w="lg" len="lg"/>
+            <a:tailEnd type="arrow" w="lg" len="lg"/>
+          </a:ln>
+        </p:spPr>
+        <p:style>
+          <a:lnRef idx="1">
+            <a:schemeClr val="accent1"/>
+          </a:lnRef>
+          <a:fillRef idx="0">
+            <a:schemeClr val="accent1"/>
+          </a:fillRef>
+          <a:effectRef idx="0">
+            <a:schemeClr val="accent1"/>
+          </a:effectRef>
+          <a:fontRef idx="minor">
+            <a:schemeClr val="tx1"/>
+          </a:fontRef>
+        </p:style>
+      </p:cxnSp>
+      <p:sp>
+        <p:nvSpPr>
+          <p:cNvPr id="19" name="Afrundet rektangel 18"/>
+          <p:cNvSpPr/>
+          <p:nvPr/>
+        </p:nvSpPr>
+        <p:spPr>
+          <a:xfrm>
+            <a:off x="3669033" y="824162"/>
+            <a:ext cx="2719848" cy="1085513"/>
+          </a:xfrm>
+          <a:prstGeom prst="roundRect">
+            <a:avLst/>
+          </a:prstGeom>
+          <a:solidFill>
+            <a:schemeClr val="accent2">
+              <a:lumMod val="75000"/>
+            </a:schemeClr>
+          </a:solidFill>
+        </p:spPr>
+        <p:style>
+          <a:lnRef idx="2">
+            <a:schemeClr val="accent1">
+              <a:shade val="50000"/>
+            </a:schemeClr>
+          </a:lnRef>
+          <a:fillRef idx="1">
+            <a:schemeClr val="accent1"/>
+          </a:fillRef>
+          <a:effectRef idx="0">
+            <a:schemeClr val="accent1"/>
+          </a:effectRef>
+          <a:fontRef idx="minor">
+            <a:schemeClr val="lt1"/>
+          </a:fontRef>
+        </p:style>
+        <p:txBody>
+          <a:bodyPr rtlCol="0" anchor="t"/>
+          <a:lstStyle/>
+          <a:p>
+            <a:pPr algn="ctr"/>
+            <a:r>
+              <a:rPr lang="da-DK" sz="3600" smtClean="0"/>
+              <a:t>Configurator</a:t>
+            </a:r>
+          </a:p>
+        </p:txBody>
+      </p:sp>
+      <p:sp>
+        <p:nvSpPr>
+          <p:cNvPr id="11" name="Afrundet rektangel 10"/>
+          <p:cNvSpPr/>
+          <p:nvPr/>
+        </p:nvSpPr>
+        <p:spPr>
+          <a:xfrm>
+            <a:off x="5929187" y="3421977"/>
+            <a:ext cx="1800460" cy="1424323"/>
+          </a:xfrm>
+          <a:prstGeom prst="roundRect">
+            <a:avLst/>
+          </a:prstGeom>
+          <a:solidFill>
+            <a:srgbClr val="C00000"/>
+          </a:solidFill>
+        </p:spPr>
+        <p:style>
+          <a:lnRef idx="2">
+            <a:schemeClr val="accent1">
+              <a:shade val="50000"/>
+            </a:schemeClr>
+          </a:lnRef>
+          <a:fillRef idx="1">
+            <a:schemeClr val="accent1"/>
+          </a:fillRef>
+          <a:effectRef idx="0">
+            <a:schemeClr val="accent1"/>
+          </a:effectRef>
+          <a:fontRef idx="minor">
+            <a:schemeClr val="lt1"/>
+          </a:fontRef>
+        </p:style>
+        <p:txBody>
+          <a:bodyPr rtlCol="0" anchor="t"/>
+          <a:lstStyle/>
+          <a:p>
+            <a:pPr algn="ctr"/>
+            <a:r>
+              <a:rPr lang="da-DK" sz="2800" smtClean="0"/>
+              <a:t>Fight</a:t>
+            </a:r>
+          </a:p>
+          <a:p>
+            <a:pPr algn="ctr"/>
+            <a:r>
+              <a:rPr lang="da-DK" sz="2800" smtClean="0"/>
+              <a:t>Club</a:t>
+            </a:r>
+          </a:p>
+          <a:p>
+            <a:pPr algn="ctr"/>
+            <a:r>
+              <a:rPr lang="da-DK" sz="2800" smtClean="0"/>
+              <a:t>Fair</a:t>
+            </a:r>
+          </a:p>
+        </p:txBody>
+      </p:sp>
+    </p:spTree>
+    <p:extLst>
+      <p:ext uri="{BB962C8B-B14F-4D97-AF65-F5344CB8AC3E}">
+        <p14:creationId xmlns:p14="http://schemas.microsoft.com/office/powerpoint/2010/main" val="3982234949"/>
+      </p:ext>
+    </p:extLst>
+  </p:cSld>
+  <p:clrMapOvr>
+    <a:masterClrMapping/>
+  </p:clrMapOvr>
+  <mc:AlternateContent xmlns:mc="http://schemas.openxmlformats.org/markup-compatibility/2006" xmlns:p14="http://schemas.microsoft.com/office/powerpoint/2010/main">
+    <mc:Choice Requires="p14">
+      <p:transition p14:dur="0"/>
+    </mc:Choice>
+    <mc:Fallback xmlns="">
+      <p:transition/>
+    </mc:Fallback>
+  </mc:AlternateContent>
+  <p:timing>
+    <p:tnLst>
+      <p:par>
+        <p:cTn id="1" dur="indefinite" restart="never" nodeType="tmRoot">
+          <p:childTnLst>
+            <p:seq concurrent="1" nextAc="seek">
+              <p:cTn id="2" dur="indefinite" nodeType="mainSeq">
+                <p:childTnLst>
+                  <p:par>
+                    <p:cTn id="3" fill="hold">
+                      <p:stCondLst>
+                        <p:cond delay="indefinite"/>
+                      </p:stCondLst>
+                      <p:childTnLst>
+                        <p:par>
+                          <p:cTn id="4" fill="hold">
+                            <p:stCondLst>
+                              <p:cond delay="0"/>
+                            </p:stCondLst>
+                            <p:childTnLst>
+                              <p:par>
+                                <p:cTn id="5" presetID="10" presetClass="entr" presetSubtype="0" fill="hold" nodeType="clickEffect">
+                                  <p:stCondLst>
+                                    <p:cond delay="0"/>
+                                  </p:stCondLst>
+                                  <p:childTnLst>
+                                    <p:set>
+                                      <p:cBhvr>
+                                        <p:cTn id="6" dur="1" fill="hold">
+                                          <p:stCondLst>
+                                            <p:cond delay="0"/>
+                                          </p:stCondLst>
+                                        </p:cTn>
+                                        <p:tgtEl>
+                                          <p:spTgt spid="26"/>
+                                        </p:tgtEl>
+                                        <p:attrNameLst>
+                                          <p:attrName>style.visibility</p:attrName>
+                                        </p:attrNameLst>
+                                      </p:cBhvr>
+                                      <p:to>
+                                        <p:strVal val="visible"/>
+                                      </p:to>
+                                    </p:set>
+                                    <p:animEffect transition="in" filter="fade">
+                                      <p:cBhvr>
+                                        <p:cTn id="7" dur="500"/>
+                                        <p:tgtEl>
+                                          <p:spTgt spid="26"/>
+                                        </p:tgtEl>
+                                      </p:cBhvr>
+                                    </p:animEffect>
+                                  </p:childTnLst>
+                                </p:cTn>
+                              </p:par>
+                              <p:par>
+                                <p:cTn id="8" presetID="10" presetClass="entr" presetSubtype="0" fill="hold" grpId="0" nodeType="withEffect">
+                                  <p:stCondLst>
+                                    <p:cond delay="0"/>
+                                  </p:stCondLst>
+                                  <p:childTnLst>
+                                    <p:set>
+                                      <p:cBhvr>
+                                        <p:cTn id="9" dur="1" fill="hold">
+                                          <p:stCondLst>
+                                            <p:cond delay="0"/>
+                                          </p:stCondLst>
+                                        </p:cTn>
+                                        <p:tgtEl>
+                                          <p:spTgt spid="19"/>
+                                        </p:tgtEl>
+                                        <p:attrNameLst>
+                                          <p:attrName>style.visibility</p:attrName>
+                                        </p:attrNameLst>
+                                      </p:cBhvr>
+                                      <p:to>
+                                        <p:strVal val="visible"/>
+                                      </p:to>
+                                    </p:set>
+                                    <p:animEffect transition="in" filter="fade">
+                                      <p:cBhvr>
+                                        <p:cTn id="10" dur="500"/>
+                                        <p:tgtEl>
+                                          <p:spTgt spid="19"/>
+                                        </p:tgtEl>
+                                      </p:cBhvr>
+                                    </p:animEffect>
+                                  </p:childTnLst>
+                                </p:cTn>
+                              </p:par>
+                              <p:par>
+                                <p:cTn id="11" presetID="10" presetClass="entr" presetSubtype="0" fill="hold" nodeType="withEffect">
+                                  <p:stCondLst>
+                                    <p:cond delay="0"/>
+                                  </p:stCondLst>
+                                  <p:childTnLst>
+                                    <p:set>
+                                      <p:cBhvr>
+                                        <p:cTn id="12" dur="1" fill="hold">
+                                          <p:stCondLst>
+                                            <p:cond delay="0"/>
+                                          </p:stCondLst>
+                                        </p:cTn>
+                                        <p:tgtEl>
+                                          <p:spTgt spid="27"/>
+                                        </p:tgtEl>
+                                        <p:attrNameLst>
+                                          <p:attrName>style.visibility</p:attrName>
+                                        </p:attrNameLst>
+                                      </p:cBhvr>
+                                      <p:to>
+                                        <p:strVal val="visible"/>
+                                      </p:to>
+                                    </p:set>
+                                    <p:animEffect transition="in" filter="fade">
+                                      <p:cBhvr>
+                                        <p:cTn id="13" dur="500"/>
+                                        <p:tgtEl>
+                                          <p:spTgt spid="27"/>
+                                        </p:tgtEl>
+                                      </p:cBhvr>
+                                    </p:animEffect>
+                                  </p:childTnLst>
+                                </p:cTn>
+                              </p:par>
+                            </p:childTnLst>
+                          </p:cTn>
+                        </p:par>
+                      </p:childTnLst>
+                    </p:cTn>
+                  </p:par>
+                </p:childTnLst>
+              </p:cTn>
+              <p:prevCondLst>
+                <p:cond evt="onPrev" delay="0">
+                  <p:tgtEl>
+                    <p:sldTgt/>
+                  </p:tgtEl>
+                </p:cond>
+              </p:prevCondLst>
+              <p:nextCondLst>
+                <p:cond evt="onNext" delay="0">
+                  <p:tgtEl>
+                    <p:sldTgt/>
+                  </p:tgtEl>
+                </p:cond>
+              </p:nextCondLst>
+            </p:seq>
+          </p:childTnLst>
+        </p:cTn>
+      </p:par>
+    </p:tnLst>
+    <p:bldLst>
+      <p:bldP spid="19" grpId="0" animBg="1"/>
+    </p:bldLst>
+  </p:timing>
+</p:sld>
+</file>
+
+<file path=ppt/slides/slide27.xml><?xml version="1.0" encoding="utf-8"?>
 <p:sld xmlns:a="http://schemas.openxmlformats.org/drawingml/2006/main" xmlns:r="http://schemas.openxmlformats.org/officeDocument/2006/relationships" xmlns:p="http://schemas.openxmlformats.org/presentationml/2006/main">
   <p:cSld>
     <p:spTree>
@@ -8335,13 +9543,7 @@
               <a:rPr lang="da-DK" sz="1600" b="1" smtClean="0">
                 <a:latin typeface="Consolas" panose="020B0609020204030204" pitchFamily="49" charset="0"/>
               </a:rPr>
-              <a:t>   </a:t>
-            </a:r>
-            <a:r>
-              <a:rPr lang="da-DK" sz="1600" b="1" smtClean="0">
-                <a:latin typeface="Consolas" panose="020B0609020204030204" pitchFamily="49" charset="0"/>
-              </a:rPr>
-              <a:t>{</a:t>
+              <a:t>   {</a:t>
             </a:r>
           </a:p>
           <a:p>
@@ -8477,13 +9679,7 @@
               <a:rPr lang="da-DK" sz="1600" b="1" smtClean="0">
                 <a:latin typeface="Consolas" panose="020B0609020204030204" pitchFamily="49" charset="0"/>
               </a:rPr>
-              <a:t>   </a:t>
-            </a:r>
-            <a:r>
-              <a:rPr lang="da-DK" sz="1600" b="1" smtClean="0">
-                <a:latin typeface="Consolas" panose="020B0609020204030204" pitchFamily="49" charset="0"/>
-              </a:rPr>
-              <a:t>}</a:t>
+              <a:t>   }</a:t>
             </a:r>
             <a:endParaRPr lang="da-DK" sz="1600" b="1">
               <a:latin typeface="Consolas" panose="020B0609020204030204" pitchFamily="49" charset="0"/>
@@ -8527,7 +9723,7 @@
 </p:sld>
 </file>
 
-<file path=ppt/slides/slide25.xml><?xml version="1.0" encoding="utf-8"?>
+<file path=ppt/slides/slide28.xml><?xml version="1.0" encoding="utf-8"?>
 <p:sld xmlns:a="http://schemas.openxmlformats.org/drawingml/2006/main" xmlns:r="http://schemas.openxmlformats.org/officeDocument/2006/relationships" xmlns:p="http://schemas.openxmlformats.org/presentationml/2006/main">
   <p:cSld>
     <p:spTree>
@@ -9188,7 +10384,6 @@
               <a:rPr lang="da-DK" sz="3200" smtClean="0"/>
               <a:t>We have defined a general algorithm</a:t>
             </a:r>
-            <a:endParaRPr lang="da-DK" sz="3200" smtClean="0"/>
           </a:p>
           <a:p>
             <a:pPr lvl="1"/>
@@ -9213,15 +10408,7 @@
                   <a:srgbClr val="FF0000"/>
                 </a:solidFill>
               </a:rPr>
-              <a:t>How to implement </a:t>
-            </a:r>
-            <a:r>
-              <a:rPr lang="da-DK" sz="3200" b="1" i="1" smtClean="0">
-                <a:solidFill>
-                  <a:srgbClr val="FF0000"/>
-                </a:solidFill>
-              </a:rPr>
-              <a:t>general algorithm once, but still allow specialised versions to be defined</a:t>
+              <a:t>How to implement general algorithm once, but still allow specialised versions to be defined</a:t>
             </a:r>
             <a:endParaRPr lang="da-DK" sz="3200" b="1" i="1">
               <a:solidFill>
@@ -9351,13 +10538,13 @@
   <p:clrMapOvr>
     <a:masterClrMapping/>
   </p:clrMapOvr>
-  <mc:AlternateContent xmlns:mc="http://schemas.openxmlformats.org/markup-compatibility/2006">
-    <mc:Choice xmlns:p14="http://schemas.microsoft.com/office/powerpoint/2010/main" Requires="p14">
+  <mc:AlternateContent xmlns:mc="http://schemas.openxmlformats.org/markup-compatibility/2006" xmlns:p14="http://schemas.microsoft.com/office/powerpoint/2010/main">
+    <mc:Choice Requires="p14">
       <p:transition spd="med" p14:dur="700">
         <p:fade/>
       </p:transition>
     </mc:Choice>
-    <mc:Fallback>
+    <mc:Fallback xmlns="">
       <p:transition spd="med">
         <p:fade/>
       </p:transition>
@@ -9951,7 +11138,6 @@
               <a:rPr lang="da-DK" sz="3600" smtClean="0"/>
               <a:t>Fighter</a:t>
             </a:r>
-            <a:endParaRPr lang="da-DK" sz="3600" smtClean="0"/>
           </a:p>
         </p:txBody>
       </p:sp>
@@ -10005,7 +11191,6 @@
               <a:rPr lang="da-DK" sz="3600" smtClean="0"/>
               <a:t>Club</a:t>
             </a:r>
-            <a:endParaRPr lang="da-DK" sz="3600" smtClean="0"/>
           </a:p>
         </p:txBody>
       </p:sp>
@@ -10219,173 +11404,158 @@
               <a:rPr lang="da-DK" sz="2400" b="1" smtClean="0">
                 <a:latin typeface="Consolas" panose="020B0609020204030204" pitchFamily="49" charset="0"/>
               </a:rPr>
-              <a:t> Stop </a:t>
+              <a:t> Stop { </a:t>
             </a:r>
             <a:r>
               <a:rPr lang="da-DK" sz="2400" b="1" smtClean="0">
-                <a:latin typeface="Consolas" panose="020B0609020204030204" pitchFamily="49" charset="0"/>
-              </a:rPr>
-              <a:t>{ </a:t>
+                <a:solidFill>
+                  <a:srgbClr val="0070C0"/>
+                </a:solidFill>
+                <a:latin typeface="Consolas" panose="020B0609020204030204" pitchFamily="49" charset="0"/>
+              </a:rPr>
+              <a:t>get</a:t>
+            </a:r>
+            <a:r>
+              <a:rPr lang="da-DK" sz="2400" b="1">
+                <a:latin typeface="Consolas" panose="020B0609020204030204" pitchFamily="49" charset="0"/>
+              </a:rPr>
+              <a:t> </a:t>
             </a:r>
             <a:r>
               <a:rPr lang="da-DK" sz="2400" b="1" smtClean="0">
+                <a:latin typeface="Consolas" panose="020B0609020204030204" pitchFamily="49" charset="0"/>
+              </a:rPr>
+              <a:t>{…} }</a:t>
+            </a:r>
+          </a:p>
+          <a:p>
+            <a:r>
+              <a:rPr lang="da-DK" sz="2400" b="1">
+                <a:latin typeface="Consolas" panose="020B0609020204030204" pitchFamily="49" charset="0"/>
+              </a:rPr>
+              <a:t> </a:t>
+            </a:r>
+            <a:r>
+              <a:rPr lang="da-DK" sz="2400" b="1" smtClean="0">
+                <a:latin typeface="Consolas" panose="020B0609020204030204" pitchFamily="49" charset="0"/>
+              </a:rPr>
+              <a:t>  </a:t>
+            </a:r>
+            <a:r>
+              <a:rPr lang="da-DK" sz="2400" b="1" smtClean="0">
                 <a:solidFill>
                   <a:srgbClr val="0070C0"/>
                 </a:solidFill>
                 <a:latin typeface="Consolas" panose="020B0609020204030204" pitchFamily="49" charset="0"/>
               </a:rPr>
-              <a:t>get</a:t>
+              <a:t>public</a:t>
+            </a:r>
+            <a:r>
+              <a:rPr lang="da-DK" sz="2400" b="1" smtClean="0">
+                <a:latin typeface="Consolas" panose="020B0609020204030204" pitchFamily="49" charset="0"/>
+              </a:rPr>
+              <a:t> </a:t>
+            </a:r>
+            <a:r>
+              <a:rPr lang="da-DK" sz="2400" b="1" smtClean="0">
+                <a:solidFill>
+                  <a:srgbClr val="0070C0"/>
+                </a:solidFill>
+                <a:latin typeface="Consolas" panose="020B0609020204030204" pitchFamily="49" charset="0"/>
+              </a:rPr>
+              <a:t>void </a:t>
+            </a:r>
+            <a:r>
+              <a:rPr lang="da-DK" sz="2400" b="1" smtClean="0">
+                <a:latin typeface="Consolas" panose="020B0609020204030204" pitchFamily="49" charset="0"/>
+              </a:rPr>
+              <a:t>Reset() {…}</a:t>
+            </a:r>
+          </a:p>
+          <a:p>
+            <a:r>
+              <a:rPr lang="da-DK" sz="2400" b="1" smtClean="0">
+                <a:solidFill>
+                  <a:srgbClr val="0070C0"/>
+                </a:solidFill>
+                <a:latin typeface="Consolas" panose="020B0609020204030204" pitchFamily="49" charset="0"/>
+              </a:rPr>
+              <a:t>   public</a:t>
+            </a:r>
+            <a:r>
+              <a:rPr lang="da-DK" sz="2400" b="1" smtClean="0">
+                <a:latin typeface="Consolas" panose="020B0609020204030204" pitchFamily="49" charset="0"/>
+              </a:rPr>
+              <a:t> </a:t>
+            </a:r>
+            <a:r>
+              <a:rPr lang="da-DK" sz="2400" b="1" smtClean="0">
+                <a:solidFill>
+                  <a:srgbClr val="0070C0"/>
+                </a:solidFill>
+                <a:latin typeface="Consolas" panose="020B0609020204030204" pitchFamily="49" charset="0"/>
+              </a:rPr>
+              <a:t>int </a:t>
+            </a:r>
+            <a:r>
+              <a:rPr lang="da-DK" sz="2400" b="1" smtClean="0">
+                <a:latin typeface="Consolas" panose="020B0609020204030204" pitchFamily="49" charset="0"/>
+              </a:rPr>
+              <a:t>DealDamage() {…}</a:t>
+            </a:r>
+          </a:p>
+          <a:p>
+            <a:r>
+              <a:rPr lang="da-DK" sz="2400" b="1" smtClean="0">
+                <a:solidFill>
+                  <a:srgbClr val="0070C0"/>
+                </a:solidFill>
+                <a:latin typeface="Consolas" panose="020B0609020204030204" pitchFamily="49" charset="0"/>
+              </a:rPr>
+              <a:t>   public</a:t>
+            </a:r>
+            <a:r>
+              <a:rPr lang="da-DK" sz="2400" b="1" smtClean="0">
+                <a:latin typeface="Consolas" panose="020B0609020204030204" pitchFamily="49" charset="0"/>
+              </a:rPr>
+              <a:t> </a:t>
+            </a:r>
+            <a:r>
+              <a:rPr lang="da-DK" sz="2400" b="1" smtClean="0">
+                <a:solidFill>
+                  <a:srgbClr val="0070C0"/>
+                </a:solidFill>
+                <a:latin typeface="Consolas" panose="020B0609020204030204" pitchFamily="49" charset="0"/>
+              </a:rPr>
+              <a:t>void </a:t>
+            </a:r>
+            <a:r>
+              <a:rPr lang="da-DK" sz="2400" b="1" smtClean="0">
+                <a:latin typeface="Consolas" panose="020B0609020204030204" pitchFamily="49" charset="0"/>
+              </a:rPr>
+              <a:t>ReceiveDamage(</a:t>
             </a:r>
             <a:r>
               <a:rPr lang="da-DK" sz="2400" b="1">
-                <a:latin typeface="Consolas" panose="020B0609020204030204" pitchFamily="49" charset="0"/>
-              </a:rPr>
-              <a:t> </a:t>
+                <a:solidFill>
+                  <a:srgbClr val="0070C0"/>
+                </a:solidFill>
+                <a:latin typeface="Consolas" panose="020B0609020204030204" pitchFamily="49" charset="0"/>
+              </a:rPr>
+              <a:t>int </a:t>
             </a:r>
             <a:r>
               <a:rPr lang="da-DK" sz="2400" b="1" smtClean="0">
                 <a:latin typeface="Consolas" panose="020B0609020204030204" pitchFamily="49" charset="0"/>
               </a:rPr>
+              <a:t>damage) </a:t>
+            </a:r>
+            <a:r>
+              <a:rPr lang="da-DK" sz="2400" b="1">
+                <a:latin typeface="Consolas" panose="020B0609020204030204" pitchFamily="49" charset="0"/>
+              </a:rPr>
               <a:t>{…}</a:t>
             </a:r>
-            <a:r>
-              <a:rPr lang="da-DK" sz="2400" b="1" smtClean="0">
-                <a:latin typeface="Consolas" panose="020B0609020204030204" pitchFamily="49" charset="0"/>
-              </a:rPr>
-              <a:t> }</a:t>
-            </a:r>
-          </a:p>
-          <a:p>
-            <a:r>
-              <a:rPr lang="da-DK" sz="2400" b="1">
-                <a:latin typeface="Consolas" panose="020B0609020204030204" pitchFamily="49" charset="0"/>
-              </a:rPr>
-              <a:t> </a:t>
-            </a:r>
-            <a:r>
-              <a:rPr lang="da-DK" sz="2400" b="1" smtClean="0">
-                <a:latin typeface="Consolas" panose="020B0609020204030204" pitchFamily="49" charset="0"/>
-              </a:rPr>
-              <a:t>  </a:t>
-            </a:r>
-            <a:r>
-              <a:rPr lang="da-DK" sz="2400" b="1" smtClean="0">
-                <a:solidFill>
-                  <a:srgbClr val="0070C0"/>
-                </a:solidFill>
-                <a:latin typeface="Consolas" panose="020B0609020204030204" pitchFamily="49" charset="0"/>
-              </a:rPr>
-              <a:t>public</a:t>
-            </a:r>
-            <a:r>
-              <a:rPr lang="da-DK" sz="2400" b="1" smtClean="0">
-                <a:latin typeface="Consolas" panose="020B0609020204030204" pitchFamily="49" charset="0"/>
-              </a:rPr>
-              <a:t> </a:t>
-            </a:r>
-            <a:r>
-              <a:rPr lang="da-DK" sz="2400" b="1" smtClean="0">
-                <a:solidFill>
-                  <a:srgbClr val="0070C0"/>
-                </a:solidFill>
-                <a:latin typeface="Consolas" panose="020B0609020204030204" pitchFamily="49" charset="0"/>
-              </a:rPr>
-              <a:t>void </a:t>
-            </a:r>
-            <a:r>
-              <a:rPr lang="da-DK" sz="2400" b="1" smtClean="0">
-                <a:latin typeface="Consolas" panose="020B0609020204030204" pitchFamily="49" charset="0"/>
-              </a:rPr>
-              <a:t>Reset() {…}</a:t>
-            </a:r>
-          </a:p>
-          <a:p>
-            <a:r>
-              <a:rPr lang="da-DK" sz="2400" b="1" smtClean="0">
-                <a:solidFill>
-                  <a:srgbClr val="0070C0"/>
-                </a:solidFill>
-                <a:latin typeface="Consolas" panose="020B0609020204030204" pitchFamily="49" charset="0"/>
-              </a:rPr>
-              <a:t>   public</a:t>
-            </a:r>
-            <a:r>
-              <a:rPr lang="da-DK" sz="2400" b="1" smtClean="0">
-                <a:latin typeface="Consolas" panose="020B0609020204030204" pitchFamily="49" charset="0"/>
-              </a:rPr>
-              <a:t> </a:t>
-            </a:r>
-            <a:r>
-              <a:rPr lang="da-DK" sz="2400" b="1" smtClean="0">
-                <a:solidFill>
-                  <a:srgbClr val="0070C0"/>
-                </a:solidFill>
-                <a:latin typeface="Consolas" panose="020B0609020204030204" pitchFamily="49" charset="0"/>
-              </a:rPr>
-              <a:t>int </a:t>
-            </a:r>
-            <a:r>
-              <a:rPr lang="da-DK" sz="2400" b="1" smtClean="0">
-                <a:latin typeface="Consolas" panose="020B0609020204030204" pitchFamily="49" charset="0"/>
-              </a:rPr>
-              <a:t>DealDamage() {…}</a:t>
-            </a:r>
-          </a:p>
-          <a:p>
-            <a:r>
-              <a:rPr lang="da-DK" sz="2400" b="1" smtClean="0">
-                <a:solidFill>
-                  <a:srgbClr val="0070C0"/>
-                </a:solidFill>
-                <a:latin typeface="Consolas" panose="020B0609020204030204" pitchFamily="49" charset="0"/>
-              </a:rPr>
-              <a:t>   public</a:t>
-            </a:r>
-            <a:r>
-              <a:rPr lang="da-DK" sz="2400" b="1" smtClean="0">
-                <a:latin typeface="Consolas" panose="020B0609020204030204" pitchFamily="49" charset="0"/>
-              </a:rPr>
-              <a:t> </a:t>
-            </a:r>
-            <a:r>
-              <a:rPr lang="da-DK" sz="2400" b="1" smtClean="0">
-                <a:solidFill>
-                  <a:srgbClr val="0070C0"/>
-                </a:solidFill>
-                <a:latin typeface="Consolas" panose="020B0609020204030204" pitchFamily="49" charset="0"/>
-              </a:rPr>
-              <a:t>void </a:t>
-            </a:r>
-            <a:r>
-              <a:rPr lang="da-DK" sz="2400" b="1" smtClean="0">
-                <a:latin typeface="Consolas" panose="020B0609020204030204" pitchFamily="49" charset="0"/>
-              </a:rPr>
-              <a:t>ReceiveDamage(</a:t>
-            </a:r>
-            <a:r>
-              <a:rPr lang="da-DK" sz="2400" b="1">
-                <a:solidFill>
-                  <a:srgbClr val="0070C0"/>
-                </a:solidFill>
-                <a:latin typeface="Consolas" panose="020B0609020204030204" pitchFamily="49" charset="0"/>
-              </a:rPr>
-              <a:t>int </a:t>
-            </a:r>
-            <a:r>
-              <a:rPr lang="da-DK" sz="2400" b="1" smtClean="0">
-                <a:latin typeface="Consolas" panose="020B0609020204030204" pitchFamily="49" charset="0"/>
-              </a:rPr>
-              <a:t>damage) </a:t>
-            </a:r>
-            <a:r>
-              <a:rPr lang="da-DK" sz="2400" b="1">
-                <a:latin typeface="Consolas" panose="020B0609020204030204" pitchFamily="49" charset="0"/>
-              </a:rPr>
-              <a:t>{…}</a:t>
-            </a:r>
-            <a:endParaRPr lang="da-DK" sz="2400" b="1">
-              <a:latin typeface="Consolas" panose="020B0609020204030204" pitchFamily="49" charset="0"/>
-            </a:endParaRPr>
           </a:p>
           <a:p>
             <a:r>
@@ -10474,16 +11644,7 @@
                 </a:solidFill>
                 <a:latin typeface="Consolas" panose="020B0609020204030204" pitchFamily="49" charset="0"/>
               </a:rPr>
-              <a:t>public </a:t>
-            </a:r>
-            <a:r>
-              <a:rPr lang="da-DK" sz="2000" b="1" smtClean="0">
-                <a:solidFill>
-                  <a:srgbClr val="0070C0"/>
-                </a:solidFill>
-                <a:latin typeface="Consolas" panose="020B0609020204030204" pitchFamily="49" charset="0"/>
-              </a:rPr>
-              <a:t>abstract class </a:t>
+              <a:t>public abstract class </a:t>
             </a:r>
             <a:r>
               <a:rPr lang="da-DK" sz="2000" b="1" smtClean="0">
@@ -10651,13 +11812,7 @@
               <a:rPr lang="da-DK" sz="2000" b="1">
                 <a:latin typeface="Consolas" panose="020B0609020204030204" pitchFamily="49" charset="0"/>
               </a:rPr>
-              <a:t> fb</a:t>
-            </a:r>
-            <a:r>
-              <a:rPr lang="da-DK" sz="2000" b="1">
-                <a:latin typeface="Consolas" panose="020B0609020204030204" pitchFamily="49" charset="0"/>
-              </a:rPr>
-              <a:t>) </a:t>
+              <a:t> fb) </a:t>
             </a:r>
             <a:r>
               <a:rPr lang="da-DK" sz="2000" b="1" smtClean="0">
@@ -10767,13 +11922,7 @@
               <a:rPr lang="da-DK" sz="2000" b="1">
                 <a:latin typeface="Consolas" panose="020B0609020204030204" pitchFamily="49" charset="0"/>
               </a:rPr>
-              <a:t> </a:t>
-            </a:r>
-            <a:r>
-              <a:rPr lang="da-DK" sz="2000" b="1">
-                <a:latin typeface="Consolas" panose="020B0609020204030204" pitchFamily="49" charset="0"/>
-              </a:rPr>
-              <a:t>fb</a:t>
+              <a:t> fb</a:t>
             </a:r>
             <a:r>
               <a:rPr lang="da-DK" sz="2000" b="1" smtClean="0">
@@ -10984,16 +12133,7 @@
                 </a:solidFill>
                 <a:latin typeface="Consolas" panose="020B0609020204030204" pitchFamily="49" charset="0"/>
               </a:rPr>
-              <a:t>in</a:t>
-            </a:r>
-            <a:r>
-              <a:rPr lang="da-DK" sz="2000" b="1">
-                <a:solidFill>
-                  <a:srgbClr val="0070C0"/>
-                </a:solidFill>
-                <a:latin typeface="Consolas" panose="020B0609020204030204" pitchFamily="49" charset="0"/>
-              </a:rPr>
-              <a:t>t</a:t>
+              <a:t>int</a:t>
             </a:r>
             <a:r>
               <a:rPr lang="da-DK" sz="2000" b="1" smtClean="0">
@@ -11167,13 +12307,7 @@
               <a:rPr lang="da-DK" sz="2000" b="1">
                 <a:latin typeface="Consolas" panose="020B0609020204030204" pitchFamily="49" charset="0"/>
               </a:rPr>
-              <a:t>, </a:t>
-            </a:r>
-            <a:r>
-              <a:rPr lang="da-DK" sz="2000" b="1">
-                <a:latin typeface="Consolas" panose="020B0609020204030204" pitchFamily="49" charset="0"/>
-              </a:rPr>
-              <a:t>winsB</a:t>
+              <a:t>, winsB</a:t>
             </a:r>
             <a:r>
               <a:rPr lang="da-DK" sz="2000" b="1" smtClean="0">
@@ -11384,16 +12518,7 @@
                 </a:solidFill>
                 <a:latin typeface="Consolas" panose="020B0609020204030204" pitchFamily="49" charset="0"/>
               </a:rPr>
-              <a:t>in</a:t>
-            </a:r>
-            <a:r>
-              <a:rPr lang="da-DK" sz="1200" b="1">
-                <a:solidFill>
-                  <a:srgbClr val="0070C0"/>
-                </a:solidFill>
-                <a:latin typeface="Consolas" panose="020B0609020204030204" pitchFamily="49" charset="0"/>
-              </a:rPr>
-              <a:t>t</a:t>
+              <a:t>int</a:t>
             </a:r>
             <a:r>
               <a:rPr lang="da-DK" sz="1200" b="1" smtClean="0">
@@ -11567,13 +12692,7 @@
               <a:rPr lang="da-DK" sz="1200" b="1">
                 <a:latin typeface="Consolas" panose="020B0609020204030204" pitchFamily="49" charset="0"/>
               </a:rPr>
-              <a:t>, </a:t>
-            </a:r>
-            <a:r>
-              <a:rPr lang="da-DK" sz="1200" b="1">
-                <a:latin typeface="Consolas" panose="020B0609020204030204" pitchFamily="49" charset="0"/>
-              </a:rPr>
-              <a:t>winsB</a:t>
+              <a:t>, winsB</a:t>
             </a:r>
             <a:r>
               <a:rPr lang="da-DK" sz="1200" b="1" smtClean="0">
@@ -11659,12 +12778,16 @@
   <p:clrMapOvr>
     <a:masterClrMapping/>
   </p:clrMapOvr>
-  <mc:AlternateContent xmlns:mc="http://schemas.openxmlformats.org/markup-compatibility/2006" xmlns:p14="http://schemas.microsoft.com/office/powerpoint/2010/main">
-    <mc:Choice Requires="p14">
-      <p:transition p14:dur="0"/>
+  <mc:AlternateContent xmlns:mc="http://schemas.openxmlformats.org/markup-compatibility/2006">
+    <mc:Choice xmlns:p14="http://schemas.microsoft.com/office/powerpoint/2010/main" Requires="p14">
+      <p:transition spd="med" p14:dur="700">
+        <p:fade/>
+      </p:transition>
     </mc:Choice>
-    <mc:Fallback xmlns="">
-      <p:transition/>
+    <mc:Fallback>
+      <p:transition spd="med">
+        <p:fade/>
+      </p:transition>
     </mc:Fallback>
   </mc:AlternateContent>
   <p:timing>

</xml_diff>